<commit_message>
Added version 1.1 presentation
</commit_message>
<xml_diff>
--- a/documentation/IaA_Project_Ρούσσης_Δημήτριος_el17408.pptx
+++ b/documentation/IaA_Project_Ρούσσης_Δημήτριος_el17408.pptx
@@ -12,6 +12,9 @@
     <p:sldId id="260" r:id="rId6"/>
     <p:sldId id="261" r:id="rId7"/>
     <p:sldId id="262" r:id="rId8"/>
+    <p:sldId id="263" r:id="rId9"/>
+    <p:sldId id="264" r:id="rId10"/>
+    <p:sldId id="265" r:id="rId11"/>
   </p:sldIdLst>
   <p:sldSz cx="12192000" cy="6858000"/>
   <p:notesSz cx="6858000" cy="9144000"/>
@@ -3779,6 +3782,187 @@
 </p:sld>
 </file>
 
+<file path=ppt/slides/slide10.xml><?xml version="1.0" encoding="utf-8"?>
+<p:sld xmlns:a="http://schemas.openxmlformats.org/drawingml/2006/main" xmlns:r="http://schemas.openxmlformats.org/officeDocument/2006/relationships" xmlns:p="http://schemas.openxmlformats.org/presentationml/2006/main">
+  <p:cSld>
+    <p:spTree>
+      <p:nvGrpSpPr>
+        <p:cNvPr id="1" name=""/>
+        <p:cNvGrpSpPr/>
+        <p:nvPr/>
+      </p:nvGrpSpPr>
+      <p:grpSpPr>
+        <a:xfrm>
+          <a:off x="0" y="0"/>
+          <a:ext cx="0" cy="0"/>
+          <a:chOff x="0" y="0"/>
+          <a:chExt cx="0" cy="0"/>
+        </a:xfrm>
+      </p:grpSpPr>
+      <p:sp>
+        <p:nvSpPr>
+          <p:cNvPr id="2" name="Title 1">
+            <a:extLst>
+              <a:ext uri="{FF2B5EF4-FFF2-40B4-BE49-F238E27FC236}">
+                <a16:creationId xmlns:a16="http://schemas.microsoft.com/office/drawing/2014/main" id="{0B7E96FC-C6AC-4E56-9661-EE99DA898731}"/>
+              </a:ext>
+            </a:extLst>
+          </p:cNvPr>
+          <p:cNvSpPr>
+            <a:spLocks noGrp="1"/>
+          </p:cNvSpPr>
+          <p:nvPr>
+            <p:ph type="title"/>
+          </p:nvPr>
+        </p:nvSpPr>
+        <p:spPr/>
+        <p:txBody>
+          <a:bodyPr/>
+          <a:lstStyle/>
+          <a:p>
+            <a:r>
+              <a:rPr lang="el-GR" dirty="0"/>
+              <a:t>Παραδείγματα(3)</a:t>
+            </a:r>
+          </a:p>
+        </p:txBody>
+      </p:sp>
+      <p:sp>
+        <p:nvSpPr>
+          <p:cNvPr id="3" name="Content Placeholder 2">
+            <a:extLst>
+              <a:ext uri="{FF2B5EF4-FFF2-40B4-BE49-F238E27FC236}">
+                <a16:creationId xmlns:a16="http://schemas.microsoft.com/office/drawing/2014/main" id="{40107A26-F93A-4591-8343-3D26146D46D8}"/>
+              </a:ext>
+            </a:extLst>
+          </p:cNvPr>
+          <p:cNvSpPr>
+            <a:spLocks noGrp="1"/>
+          </p:cNvSpPr>
+          <p:nvPr>
+            <p:ph idx="1"/>
+          </p:nvPr>
+        </p:nvSpPr>
+        <p:spPr/>
+        <p:txBody>
+          <a:bodyPr/>
+          <a:lstStyle/>
+          <a:p>
+            <a:pPr marL="0" indent="0">
+              <a:buNone/>
+            </a:pPr>
+            <a:r>
+              <a:rPr lang="el-GR" dirty="0"/>
+              <a:t>Αναζήτηση για</a:t>
+            </a:r>
+          </a:p>
+          <a:p>
+            <a:pPr marL="0" indent="0">
+              <a:buNone/>
+            </a:pPr>
+            <a:r>
+              <a:rPr lang="el-GR" dirty="0"/>
+              <a:t>την ασθένεια</a:t>
+            </a:r>
+          </a:p>
+          <a:p>
+            <a:pPr marL="0" indent="0">
+              <a:buNone/>
+            </a:pPr>
+            <a:r>
+              <a:rPr lang="en-US" dirty="0" err="1"/>
+              <a:t>Myelofibr</a:t>
+            </a:r>
+            <a:r>
+              <a:rPr lang="el-GR"/>
+              <a:t>ο</a:t>
+            </a:r>
+            <a:r>
+              <a:rPr lang="en-US"/>
+              <a:t>sis</a:t>
+            </a:r>
+            <a:r>
+              <a:rPr lang="el-GR" dirty="0"/>
+              <a:t>,</a:t>
+            </a:r>
+            <a:endParaRPr lang="en-US" dirty="0"/>
+          </a:p>
+          <a:p>
+            <a:pPr marL="0" indent="0">
+              <a:buNone/>
+            </a:pPr>
+            <a:r>
+              <a:rPr lang="el-GR" dirty="0"/>
+              <a:t>σε </a:t>
+            </a:r>
+            <a:r>
+              <a:rPr lang="en-US" dirty="0"/>
+              <a:t>json</a:t>
+            </a:r>
+          </a:p>
+          <a:p>
+            <a:pPr marL="0" indent="0">
+              <a:buNone/>
+            </a:pPr>
+            <a:r>
+              <a:rPr lang="el-GR" dirty="0"/>
+              <a:t>παρουσίαση.</a:t>
+            </a:r>
+          </a:p>
+          <a:p>
+            <a:endParaRPr lang="el-GR" dirty="0"/>
+          </a:p>
+        </p:txBody>
+      </p:sp>
+      <p:pic>
+        <p:nvPicPr>
+          <p:cNvPr id="5" name="Picture 4">
+            <a:extLst>
+              <a:ext uri="{FF2B5EF4-FFF2-40B4-BE49-F238E27FC236}">
+                <a16:creationId xmlns:a16="http://schemas.microsoft.com/office/drawing/2014/main" id="{00A28EEA-0473-4D8A-BF91-44C75959A76F}"/>
+              </a:ext>
+            </a:extLst>
+          </p:cNvPr>
+          <p:cNvPicPr>
+            <a:picLocks noChangeAspect="1"/>
+          </p:cNvPicPr>
+          <p:nvPr/>
+        </p:nvPicPr>
+        <p:blipFill>
+          <a:blip r:embed="rId2">
+            <a:extLst>
+              <a:ext uri="{28A0092B-C50C-407E-A947-70E740481C1C}">
+                <a14:useLocalDpi xmlns:a14="http://schemas.microsoft.com/office/drawing/2010/main" val="0"/>
+              </a:ext>
+            </a:extLst>
+          </a:blip>
+          <a:stretch>
+            <a:fillRect/>
+          </a:stretch>
+        </p:blipFill>
+        <p:spPr>
+          <a:xfrm>
+            <a:off x="3122626" y="1825625"/>
+            <a:ext cx="8231174" cy="4312708"/>
+          </a:xfrm>
+          <a:prstGeom prst="rect">
+            <a:avLst/>
+          </a:prstGeom>
+        </p:spPr>
+      </p:pic>
+    </p:spTree>
+    <p:extLst>
+      <p:ext uri="{BB962C8B-B14F-4D97-AF65-F5344CB8AC3E}">
+        <p14:creationId xmlns:p14="http://schemas.microsoft.com/office/powerpoint/2010/main" val="3916805204"/>
+      </p:ext>
+    </p:extLst>
+  </p:cSld>
+  <p:clrMapOvr>
+    <a:masterClrMapping/>
+  </p:clrMapOvr>
+</p:sld>
+</file>
+
 <file path=ppt/slides/slide2.xml><?xml version="1.0" encoding="utf-8"?>
 <p:sld xmlns:a="http://schemas.openxmlformats.org/drawingml/2006/main" xmlns:r="http://schemas.openxmlformats.org/officeDocument/2006/relationships" xmlns:p="http://schemas.openxmlformats.org/presentationml/2006/main">
   <p:cSld>
@@ -5428,6 +5612,292 @@
     <p:extLst>
       <p:ext uri="{BB962C8B-B14F-4D97-AF65-F5344CB8AC3E}">
         <p14:creationId xmlns:p14="http://schemas.microsoft.com/office/powerpoint/2010/main" val="1993335336"/>
+      </p:ext>
+    </p:extLst>
+  </p:cSld>
+  <p:clrMapOvr>
+    <a:masterClrMapping/>
+  </p:clrMapOvr>
+</p:sld>
+</file>
+
+<file path=ppt/slides/slide8.xml><?xml version="1.0" encoding="utf-8"?>
+<p:sld xmlns:a="http://schemas.openxmlformats.org/drawingml/2006/main" xmlns:r="http://schemas.openxmlformats.org/officeDocument/2006/relationships" xmlns:p="http://schemas.openxmlformats.org/presentationml/2006/main">
+  <p:cSld>
+    <p:spTree>
+      <p:nvGrpSpPr>
+        <p:cNvPr id="1" name=""/>
+        <p:cNvGrpSpPr/>
+        <p:nvPr/>
+      </p:nvGrpSpPr>
+      <p:grpSpPr>
+        <a:xfrm>
+          <a:off x="0" y="0"/>
+          <a:ext cx="0" cy="0"/>
+          <a:chOff x="0" y="0"/>
+          <a:chExt cx="0" cy="0"/>
+        </a:xfrm>
+      </p:grpSpPr>
+      <p:sp>
+        <p:nvSpPr>
+          <p:cNvPr id="2" name="Title 1">
+            <a:extLst>
+              <a:ext uri="{FF2B5EF4-FFF2-40B4-BE49-F238E27FC236}">
+                <a16:creationId xmlns:a16="http://schemas.microsoft.com/office/drawing/2014/main" id="{92C1792D-3109-4682-B073-92141074C292}"/>
+              </a:ext>
+            </a:extLst>
+          </p:cNvPr>
+          <p:cNvSpPr>
+            <a:spLocks noGrp="1"/>
+          </p:cNvSpPr>
+          <p:nvPr>
+            <p:ph type="title"/>
+          </p:nvPr>
+        </p:nvSpPr>
+        <p:spPr/>
+        <p:txBody>
+          <a:bodyPr/>
+          <a:lstStyle/>
+          <a:p>
+            <a:r>
+              <a:rPr lang="el-GR" dirty="0"/>
+              <a:t>Παραδείγματα</a:t>
+            </a:r>
+          </a:p>
+        </p:txBody>
+      </p:sp>
+      <p:sp>
+        <p:nvSpPr>
+          <p:cNvPr id="7" name="Content Placeholder 6">
+            <a:extLst>
+              <a:ext uri="{FF2B5EF4-FFF2-40B4-BE49-F238E27FC236}">
+                <a16:creationId xmlns:a16="http://schemas.microsoft.com/office/drawing/2014/main" id="{57833AC9-E6DD-4B7B-AFA0-94159E7823A3}"/>
+              </a:ext>
+            </a:extLst>
+          </p:cNvPr>
+          <p:cNvSpPr>
+            <a:spLocks noGrp="1"/>
+          </p:cNvSpPr>
+          <p:nvPr>
+            <p:ph idx="1"/>
+          </p:nvPr>
+        </p:nvSpPr>
+        <p:spPr/>
+        <p:txBody>
+          <a:bodyPr/>
+          <a:lstStyle/>
+          <a:p>
+            <a:pPr marL="0" indent="0">
+              <a:buNone/>
+            </a:pPr>
+            <a:r>
+              <a:rPr lang="en-US" dirty="0"/>
+              <a:t>index.html</a:t>
+            </a:r>
+            <a:endParaRPr lang="el-GR" dirty="0"/>
+          </a:p>
+        </p:txBody>
+      </p:sp>
+      <p:pic>
+        <p:nvPicPr>
+          <p:cNvPr id="9" name="Picture 8">
+            <a:extLst>
+              <a:ext uri="{FF2B5EF4-FFF2-40B4-BE49-F238E27FC236}">
+                <a16:creationId xmlns:a16="http://schemas.microsoft.com/office/drawing/2014/main" id="{B87AB9CD-EEE9-47A0-B373-3D5A2EB40A1A}"/>
+              </a:ext>
+            </a:extLst>
+          </p:cNvPr>
+          <p:cNvPicPr>
+            <a:picLocks noChangeAspect="1"/>
+          </p:cNvPicPr>
+          <p:nvPr/>
+        </p:nvPicPr>
+        <p:blipFill>
+          <a:blip r:embed="rId2">
+            <a:extLst>
+              <a:ext uri="{28A0092B-C50C-407E-A947-70E740481C1C}">
+                <a14:useLocalDpi xmlns:a14="http://schemas.microsoft.com/office/drawing/2010/main" val="0"/>
+              </a:ext>
+            </a:extLst>
+          </a:blip>
+          <a:stretch>
+            <a:fillRect/>
+          </a:stretch>
+        </p:blipFill>
+        <p:spPr>
+          <a:xfrm>
+            <a:off x="2757268" y="1289248"/>
+            <a:ext cx="8689123" cy="5568752"/>
+          </a:xfrm>
+          <a:prstGeom prst="rect">
+            <a:avLst/>
+          </a:prstGeom>
+        </p:spPr>
+      </p:pic>
+    </p:spTree>
+    <p:extLst>
+      <p:ext uri="{BB962C8B-B14F-4D97-AF65-F5344CB8AC3E}">
+        <p14:creationId xmlns:p14="http://schemas.microsoft.com/office/powerpoint/2010/main" val="2986721892"/>
+      </p:ext>
+    </p:extLst>
+  </p:cSld>
+  <p:clrMapOvr>
+    <a:masterClrMapping/>
+  </p:clrMapOvr>
+</p:sld>
+</file>
+
+<file path=ppt/slides/slide9.xml><?xml version="1.0" encoding="utf-8"?>
+<p:sld xmlns:a="http://schemas.openxmlformats.org/drawingml/2006/main" xmlns:r="http://schemas.openxmlformats.org/officeDocument/2006/relationships" xmlns:p="http://schemas.openxmlformats.org/presentationml/2006/main">
+  <p:cSld>
+    <p:spTree>
+      <p:nvGrpSpPr>
+        <p:cNvPr id="1" name=""/>
+        <p:cNvGrpSpPr/>
+        <p:nvPr/>
+      </p:nvGrpSpPr>
+      <p:grpSpPr>
+        <a:xfrm>
+          <a:off x="0" y="0"/>
+          <a:ext cx="0" cy="0"/>
+          <a:chOff x="0" y="0"/>
+          <a:chExt cx="0" cy="0"/>
+        </a:xfrm>
+      </p:grpSpPr>
+      <p:sp>
+        <p:nvSpPr>
+          <p:cNvPr id="2" name="Title 1">
+            <a:extLst>
+              <a:ext uri="{FF2B5EF4-FFF2-40B4-BE49-F238E27FC236}">
+                <a16:creationId xmlns:a16="http://schemas.microsoft.com/office/drawing/2014/main" id="{0FF57752-D139-41A6-B9FC-4A9090D18043}"/>
+              </a:ext>
+            </a:extLst>
+          </p:cNvPr>
+          <p:cNvSpPr>
+            <a:spLocks noGrp="1"/>
+          </p:cNvSpPr>
+          <p:nvPr>
+            <p:ph type="title"/>
+          </p:nvPr>
+        </p:nvSpPr>
+        <p:spPr/>
+        <p:txBody>
+          <a:bodyPr/>
+          <a:lstStyle/>
+          <a:p>
+            <a:r>
+              <a:rPr lang="el-GR" dirty="0"/>
+              <a:t>Παραδείγματα(2)</a:t>
+            </a:r>
+          </a:p>
+        </p:txBody>
+      </p:sp>
+      <p:sp>
+        <p:nvSpPr>
+          <p:cNvPr id="3" name="Content Placeholder 2">
+            <a:extLst>
+              <a:ext uri="{FF2B5EF4-FFF2-40B4-BE49-F238E27FC236}">
+                <a16:creationId xmlns:a16="http://schemas.microsoft.com/office/drawing/2014/main" id="{567AE718-4E57-4C5C-9919-B1C2632C57B5}"/>
+              </a:ext>
+            </a:extLst>
+          </p:cNvPr>
+          <p:cNvSpPr>
+            <a:spLocks noGrp="1"/>
+          </p:cNvSpPr>
+          <p:nvPr>
+            <p:ph idx="1"/>
+          </p:nvPr>
+        </p:nvSpPr>
+        <p:spPr/>
+        <p:txBody>
+          <a:bodyPr/>
+          <a:lstStyle/>
+          <a:p>
+            <a:pPr marL="0" indent="0">
+              <a:buNone/>
+            </a:pPr>
+            <a:r>
+              <a:rPr lang="el-GR" dirty="0"/>
+              <a:t>Αναζήτηση για</a:t>
+            </a:r>
+          </a:p>
+          <a:p>
+            <a:pPr marL="0" indent="0">
+              <a:buNone/>
+            </a:pPr>
+            <a:r>
+              <a:rPr lang="el-GR" dirty="0"/>
+              <a:t>την ασθένεια</a:t>
+            </a:r>
+          </a:p>
+          <a:p>
+            <a:pPr marL="0" indent="0">
+              <a:buNone/>
+            </a:pPr>
+            <a:r>
+              <a:rPr lang="en-US" dirty="0"/>
+              <a:t>AIDS</a:t>
+            </a:r>
+            <a:r>
+              <a:rPr lang="el-GR" dirty="0"/>
+              <a:t> , σε </a:t>
+            </a:r>
+            <a:r>
+              <a:rPr lang="en-US" dirty="0"/>
+              <a:t>map</a:t>
+            </a:r>
+          </a:p>
+          <a:p>
+            <a:pPr marL="0" indent="0">
+              <a:buNone/>
+            </a:pPr>
+            <a:r>
+              <a:rPr lang="el-GR" dirty="0"/>
+              <a:t>παρουσίαση.</a:t>
+            </a:r>
+          </a:p>
+        </p:txBody>
+      </p:sp>
+      <p:pic>
+        <p:nvPicPr>
+          <p:cNvPr id="7" name="Picture 6">
+            <a:extLst>
+              <a:ext uri="{FF2B5EF4-FFF2-40B4-BE49-F238E27FC236}">
+                <a16:creationId xmlns:a16="http://schemas.microsoft.com/office/drawing/2014/main" id="{ACAFA92D-A204-4CD0-BEE5-5BB6E68D3EF4}"/>
+              </a:ext>
+            </a:extLst>
+          </p:cNvPr>
+          <p:cNvPicPr>
+            <a:picLocks noChangeAspect="1"/>
+          </p:cNvPicPr>
+          <p:nvPr/>
+        </p:nvPicPr>
+        <p:blipFill>
+          <a:blip r:embed="rId2">
+            <a:extLst>
+              <a:ext uri="{28A0092B-C50C-407E-A947-70E740481C1C}">
+                <a14:useLocalDpi xmlns:a14="http://schemas.microsoft.com/office/drawing/2010/main" val="0"/>
+              </a:ext>
+            </a:extLst>
+          </a:blip>
+          <a:stretch>
+            <a:fillRect/>
+          </a:stretch>
+        </p:blipFill>
+        <p:spPr>
+          <a:xfrm>
+            <a:off x="3601328" y="1448972"/>
+            <a:ext cx="7496977" cy="5409027"/>
+          </a:xfrm>
+          <a:prstGeom prst="rect">
+            <a:avLst/>
+          </a:prstGeom>
+        </p:spPr>
+      </p:pic>
+    </p:spTree>
+    <p:extLst>
+      <p:ext uri="{BB962C8B-B14F-4D97-AF65-F5344CB8AC3E}">
+        <p14:creationId xmlns:p14="http://schemas.microsoft.com/office/powerpoint/2010/main" val="3825237053"/>
       </p:ext>
     </p:extLst>
   </p:cSld>

</xml_diff>

<commit_message>
Added version 1.2 presentation
</commit_message>
<xml_diff>
--- a/documentation/IaA_Project_Ρούσσης_Δημήτριος_el17408.pptx
+++ b/documentation/IaA_Project_Ρούσσης_Δημήτριος_el17408.pptx
@@ -270,7 +270,7 @@
           <a:p>
             <a:fld id="{79BF2183-8578-4011-9672-36CA47CFE6D5}" type="datetimeFigureOut">
               <a:rPr lang="el-GR" smtClean="0"/>
-              <a:t>27/7/2020</a:t>
+              <a:t>5/8/2020</a:t>
             </a:fld>
             <a:endParaRPr lang="el-GR"/>
           </a:p>
@@ -470,7 +470,7 @@
           <a:p>
             <a:fld id="{79BF2183-8578-4011-9672-36CA47CFE6D5}" type="datetimeFigureOut">
               <a:rPr lang="el-GR" smtClean="0"/>
-              <a:t>27/7/2020</a:t>
+              <a:t>5/8/2020</a:t>
             </a:fld>
             <a:endParaRPr lang="el-GR"/>
           </a:p>
@@ -680,7 +680,7 @@
           <a:p>
             <a:fld id="{79BF2183-8578-4011-9672-36CA47CFE6D5}" type="datetimeFigureOut">
               <a:rPr lang="el-GR" smtClean="0"/>
-              <a:t>27/7/2020</a:t>
+              <a:t>5/8/2020</a:t>
             </a:fld>
             <a:endParaRPr lang="el-GR"/>
           </a:p>
@@ -880,7 +880,7 @@
           <a:p>
             <a:fld id="{79BF2183-8578-4011-9672-36CA47CFE6D5}" type="datetimeFigureOut">
               <a:rPr lang="el-GR" smtClean="0"/>
-              <a:t>27/7/2020</a:t>
+              <a:t>5/8/2020</a:t>
             </a:fld>
             <a:endParaRPr lang="el-GR"/>
           </a:p>
@@ -1156,7 +1156,7 @@
           <a:p>
             <a:fld id="{79BF2183-8578-4011-9672-36CA47CFE6D5}" type="datetimeFigureOut">
               <a:rPr lang="el-GR" smtClean="0"/>
-              <a:t>27/7/2020</a:t>
+              <a:t>5/8/2020</a:t>
             </a:fld>
             <a:endParaRPr lang="el-GR"/>
           </a:p>
@@ -1424,7 +1424,7 @@
           <a:p>
             <a:fld id="{79BF2183-8578-4011-9672-36CA47CFE6D5}" type="datetimeFigureOut">
               <a:rPr lang="el-GR" smtClean="0"/>
-              <a:t>27/7/2020</a:t>
+              <a:t>5/8/2020</a:t>
             </a:fld>
             <a:endParaRPr lang="el-GR"/>
           </a:p>
@@ -1839,7 +1839,7 @@
           <a:p>
             <a:fld id="{79BF2183-8578-4011-9672-36CA47CFE6D5}" type="datetimeFigureOut">
               <a:rPr lang="el-GR" smtClean="0"/>
-              <a:t>27/7/2020</a:t>
+              <a:t>5/8/2020</a:t>
             </a:fld>
             <a:endParaRPr lang="el-GR"/>
           </a:p>
@@ -1981,7 +1981,7 @@
           <a:p>
             <a:fld id="{79BF2183-8578-4011-9672-36CA47CFE6D5}" type="datetimeFigureOut">
               <a:rPr lang="el-GR" smtClean="0"/>
-              <a:t>27/7/2020</a:t>
+              <a:t>5/8/2020</a:t>
             </a:fld>
             <a:endParaRPr lang="el-GR"/>
           </a:p>
@@ -2094,7 +2094,7 @@
           <a:p>
             <a:fld id="{79BF2183-8578-4011-9672-36CA47CFE6D5}" type="datetimeFigureOut">
               <a:rPr lang="el-GR" smtClean="0"/>
-              <a:t>27/7/2020</a:t>
+              <a:t>5/8/2020</a:t>
             </a:fld>
             <a:endParaRPr lang="el-GR"/>
           </a:p>
@@ -2407,7 +2407,7 @@
           <a:p>
             <a:fld id="{79BF2183-8578-4011-9672-36CA47CFE6D5}" type="datetimeFigureOut">
               <a:rPr lang="el-GR" smtClean="0"/>
-              <a:t>27/7/2020</a:t>
+              <a:t>5/8/2020</a:t>
             </a:fld>
             <a:endParaRPr lang="el-GR"/>
           </a:p>
@@ -2696,7 +2696,7 @@
           <a:p>
             <a:fld id="{79BF2183-8578-4011-9672-36CA47CFE6D5}" type="datetimeFigureOut">
               <a:rPr lang="el-GR" smtClean="0"/>
-              <a:t>27/7/2020</a:t>
+              <a:t>5/8/2020</a:t>
             </a:fld>
             <a:endParaRPr lang="el-GR"/>
           </a:p>
@@ -2939,7 +2939,7 @@
           <a:p>
             <a:fld id="{79BF2183-8578-4011-9672-36CA47CFE6D5}" type="datetimeFigureOut">
               <a:rPr lang="el-GR" smtClean="0"/>
-              <a:t>27/7/2020</a:t>
+              <a:t>5/8/2020</a:t>
             </a:fld>
             <a:endParaRPr lang="el-GR"/>
           </a:p>
@@ -4188,7 +4188,7 @@
             </a:r>
             <a:r>
               <a:rPr lang="el-GR" dirty="0"/>
-              <a:t>και τόσο προετοιμάζει τα αρχεία αλλά και τα βάζει και στην βάση δεδομένων (την δημιουργεί αν δεν υπάρχει).</a:t>
+              <a:t>και τόσο προετοιμάζει τα αρχεία, κρατώντας μόνο τα χρήσιμα δεδομένα, αλλά και τα βάζει και στην βάση δεδομένων (την δημιουργεί αν δεν υπάρχει).</a:t>
             </a:r>
             <a:endParaRPr lang="en-US" dirty="0"/>
           </a:p>
@@ -5855,6 +5855,12 @@
               <a:rPr lang="el-GR" dirty="0"/>
               <a:t>παρουσίαση.</a:t>
             </a:r>
+          </a:p>
+          <a:p>
+            <a:pPr marL="0" indent="0">
+              <a:buNone/>
+            </a:pPr>
+            <a:endParaRPr lang="el-GR" dirty="0"/>
           </a:p>
         </p:txBody>
       </p:sp>

</xml_diff>

<commit_message>
Changed output.html to index.html
</commit_message>
<xml_diff>
--- a/documentation/IaA_Project_Ρούσσης_Δημήτριος_el17408.pptx
+++ b/documentation/IaA_Project_Ρούσσης_Δημήτριος_el17408.pptx
@@ -270,7 +270,7 @@
           <a:p>
             <a:fld id="{79BF2183-8578-4011-9672-36CA47CFE6D5}" type="datetimeFigureOut">
               <a:rPr lang="el-GR" smtClean="0"/>
-              <a:t>5/8/2020</a:t>
+              <a:t>6/8/2020</a:t>
             </a:fld>
             <a:endParaRPr lang="el-GR"/>
           </a:p>
@@ -470,7 +470,7 @@
           <a:p>
             <a:fld id="{79BF2183-8578-4011-9672-36CA47CFE6D5}" type="datetimeFigureOut">
               <a:rPr lang="el-GR" smtClean="0"/>
-              <a:t>5/8/2020</a:t>
+              <a:t>6/8/2020</a:t>
             </a:fld>
             <a:endParaRPr lang="el-GR"/>
           </a:p>
@@ -680,7 +680,7 @@
           <a:p>
             <a:fld id="{79BF2183-8578-4011-9672-36CA47CFE6D5}" type="datetimeFigureOut">
               <a:rPr lang="el-GR" smtClean="0"/>
-              <a:t>5/8/2020</a:t>
+              <a:t>6/8/2020</a:t>
             </a:fld>
             <a:endParaRPr lang="el-GR"/>
           </a:p>
@@ -880,7 +880,7 @@
           <a:p>
             <a:fld id="{79BF2183-8578-4011-9672-36CA47CFE6D5}" type="datetimeFigureOut">
               <a:rPr lang="el-GR" smtClean="0"/>
-              <a:t>5/8/2020</a:t>
+              <a:t>6/8/2020</a:t>
             </a:fld>
             <a:endParaRPr lang="el-GR"/>
           </a:p>
@@ -1156,7 +1156,7 @@
           <a:p>
             <a:fld id="{79BF2183-8578-4011-9672-36CA47CFE6D5}" type="datetimeFigureOut">
               <a:rPr lang="el-GR" smtClean="0"/>
-              <a:t>5/8/2020</a:t>
+              <a:t>6/8/2020</a:t>
             </a:fld>
             <a:endParaRPr lang="el-GR"/>
           </a:p>
@@ -1424,7 +1424,7 @@
           <a:p>
             <a:fld id="{79BF2183-8578-4011-9672-36CA47CFE6D5}" type="datetimeFigureOut">
               <a:rPr lang="el-GR" smtClean="0"/>
-              <a:t>5/8/2020</a:t>
+              <a:t>6/8/2020</a:t>
             </a:fld>
             <a:endParaRPr lang="el-GR"/>
           </a:p>
@@ -1839,7 +1839,7 @@
           <a:p>
             <a:fld id="{79BF2183-8578-4011-9672-36CA47CFE6D5}" type="datetimeFigureOut">
               <a:rPr lang="el-GR" smtClean="0"/>
-              <a:t>5/8/2020</a:t>
+              <a:t>6/8/2020</a:t>
             </a:fld>
             <a:endParaRPr lang="el-GR"/>
           </a:p>
@@ -1981,7 +1981,7 @@
           <a:p>
             <a:fld id="{79BF2183-8578-4011-9672-36CA47CFE6D5}" type="datetimeFigureOut">
               <a:rPr lang="el-GR" smtClean="0"/>
-              <a:t>5/8/2020</a:t>
+              <a:t>6/8/2020</a:t>
             </a:fld>
             <a:endParaRPr lang="el-GR"/>
           </a:p>
@@ -2094,7 +2094,7 @@
           <a:p>
             <a:fld id="{79BF2183-8578-4011-9672-36CA47CFE6D5}" type="datetimeFigureOut">
               <a:rPr lang="el-GR" smtClean="0"/>
-              <a:t>5/8/2020</a:t>
+              <a:t>6/8/2020</a:t>
             </a:fld>
             <a:endParaRPr lang="el-GR"/>
           </a:p>
@@ -2407,7 +2407,7 @@
           <a:p>
             <a:fld id="{79BF2183-8578-4011-9672-36CA47CFE6D5}" type="datetimeFigureOut">
               <a:rPr lang="el-GR" smtClean="0"/>
-              <a:t>5/8/2020</a:t>
+              <a:t>6/8/2020</a:t>
             </a:fld>
             <a:endParaRPr lang="el-GR"/>
           </a:p>
@@ -2696,7 +2696,7 @@
           <a:p>
             <a:fld id="{79BF2183-8578-4011-9672-36CA47CFE6D5}" type="datetimeFigureOut">
               <a:rPr lang="el-GR" smtClean="0"/>
-              <a:t>5/8/2020</a:t>
+              <a:t>6/8/2020</a:t>
             </a:fld>
             <a:endParaRPr lang="el-GR"/>
           </a:p>
@@ -2939,7 +2939,7 @@
           <a:p>
             <a:fld id="{79BF2183-8578-4011-9672-36CA47CFE6D5}" type="datetimeFigureOut">
               <a:rPr lang="el-GR" smtClean="0"/>
-              <a:t>5/8/2020</a:t>
+              <a:t>6/8/2020</a:t>
             </a:fld>
             <a:endParaRPr lang="el-GR"/>
           </a:p>
@@ -5258,13 +5258,31 @@
               <a:rPr lang="en-US" sz="2000" dirty="0">
                 <a:hlinkClick r:id="rId2"/>
               </a:rPr>
-              <a:t>http://localhost:8080/appathon_project/</a:t>
+              <a:t>http://localhost:8080/</a:t>
             </a:r>
             <a:r>
               <a:rPr lang="en-US" sz="2000" dirty="0" err="1">
                 <a:hlinkClick r:id="rId2"/>
               </a:rPr>
-              <a:t>output.html?search</a:t>
+              <a:t>appathon_project</a:t>
+            </a:r>
+            <a:r>
+              <a:rPr lang="en-US" sz="2000" dirty="0">
+                <a:hlinkClick r:id="rId2"/>
+              </a:rPr>
+              <a:t>/</a:t>
+            </a:r>
+            <a:r>
+              <a:rPr lang="en-US" sz="2000">
+                <a:hlinkClick r:id="rId2"/>
+              </a:rPr>
+              <a:t>index.</a:t>
+            </a:r>
+            <a:r>
+              <a:rPr lang="en-US" sz="2000" dirty="0" err="1">
+                <a:hlinkClick r:id="rId2"/>
+              </a:rPr>
+              <a:t>html?search</a:t>
             </a:r>
             <a:r>
               <a:rPr lang="en-US" sz="2000" dirty="0">

</xml_diff>

<commit_message>
parser now takes the condition and mesh_terms tags from xml files
</commit_message>
<xml_diff>
--- a/documentation/IaA_Project_Ρούσσης_Δημήτριος_el17408.pptx
+++ b/documentation/IaA_Project_Ρούσσης_Δημήτριος_el17408.pptx
@@ -270,7 +270,7 @@
           <a:p>
             <a:fld id="{79BF2183-8578-4011-9672-36CA47CFE6D5}" type="datetimeFigureOut">
               <a:rPr lang="el-GR" smtClean="0"/>
-              <a:t>6/8/2020</a:t>
+              <a:t>7/8/2020</a:t>
             </a:fld>
             <a:endParaRPr lang="el-GR"/>
           </a:p>
@@ -470,7 +470,7 @@
           <a:p>
             <a:fld id="{79BF2183-8578-4011-9672-36CA47CFE6D5}" type="datetimeFigureOut">
               <a:rPr lang="el-GR" smtClean="0"/>
-              <a:t>6/8/2020</a:t>
+              <a:t>7/8/2020</a:t>
             </a:fld>
             <a:endParaRPr lang="el-GR"/>
           </a:p>
@@ -680,7 +680,7 @@
           <a:p>
             <a:fld id="{79BF2183-8578-4011-9672-36CA47CFE6D5}" type="datetimeFigureOut">
               <a:rPr lang="el-GR" smtClean="0"/>
-              <a:t>6/8/2020</a:t>
+              <a:t>7/8/2020</a:t>
             </a:fld>
             <a:endParaRPr lang="el-GR"/>
           </a:p>
@@ -880,7 +880,7 @@
           <a:p>
             <a:fld id="{79BF2183-8578-4011-9672-36CA47CFE6D5}" type="datetimeFigureOut">
               <a:rPr lang="el-GR" smtClean="0"/>
-              <a:t>6/8/2020</a:t>
+              <a:t>7/8/2020</a:t>
             </a:fld>
             <a:endParaRPr lang="el-GR"/>
           </a:p>
@@ -1156,7 +1156,7 @@
           <a:p>
             <a:fld id="{79BF2183-8578-4011-9672-36CA47CFE6D5}" type="datetimeFigureOut">
               <a:rPr lang="el-GR" smtClean="0"/>
-              <a:t>6/8/2020</a:t>
+              <a:t>7/8/2020</a:t>
             </a:fld>
             <a:endParaRPr lang="el-GR"/>
           </a:p>
@@ -1424,7 +1424,7 @@
           <a:p>
             <a:fld id="{79BF2183-8578-4011-9672-36CA47CFE6D5}" type="datetimeFigureOut">
               <a:rPr lang="el-GR" smtClean="0"/>
-              <a:t>6/8/2020</a:t>
+              <a:t>7/8/2020</a:t>
             </a:fld>
             <a:endParaRPr lang="el-GR"/>
           </a:p>
@@ -1839,7 +1839,7 @@
           <a:p>
             <a:fld id="{79BF2183-8578-4011-9672-36CA47CFE6D5}" type="datetimeFigureOut">
               <a:rPr lang="el-GR" smtClean="0"/>
-              <a:t>6/8/2020</a:t>
+              <a:t>7/8/2020</a:t>
             </a:fld>
             <a:endParaRPr lang="el-GR"/>
           </a:p>
@@ -1981,7 +1981,7 @@
           <a:p>
             <a:fld id="{79BF2183-8578-4011-9672-36CA47CFE6D5}" type="datetimeFigureOut">
               <a:rPr lang="el-GR" smtClean="0"/>
-              <a:t>6/8/2020</a:t>
+              <a:t>7/8/2020</a:t>
             </a:fld>
             <a:endParaRPr lang="el-GR"/>
           </a:p>
@@ -2094,7 +2094,7 @@
           <a:p>
             <a:fld id="{79BF2183-8578-4011-9672-36CA47CFE6D5}" type="datetimeFigureOut">
               <a:rPr lang="el-GR" smtClean="0"/>
-              <a:t>6/8/2020</a:t>
+              <a:t>7/8/2020</a:t>
             </a:fld>
             <a:endParaRPr lang="el-GR"/>
           </a:p>
@@ -2407,7 +2407,7 @@
           <a:p>
             <a:fld id="{79BF2183-8578-4011-9672-36CA47CFE6D5}" type="datetimeFigureOut">
               <a:rPr lang="el-GR" smtClean="0"/>
-              <a:t>6/8/2020</a:t>
+              <a:t>7/8/2020</a:t>
             </a:fld>
             <a:endParaRPr lang="el-GR"/>
           </a:p>
@@ -2696,7 +2696,7 @@
           <a:p>
             <a:fld id="{79BF2183-8578-4011-9672-36CA47CFE6D5}" type="datetimeFigureOut">
               <a:rPr lang="el-GR" smtClean="0"/>
-              <a:t>6/8/2020</a:t>
+              <a:t>7/8/2020</a:t>
             </a:fld>
             <a:endParaRPr lang="el-GR"/>
           </a:p>
@@ -2939,7 +2939,7 @@
           <a:p>
             <a:fld id="{79BF2183-8578-4011-9672-36CA47CFE6D5}" type="datetimeFigureOut">
               <a:rPr lang="el-GR" smtClean="0"/>
-              <a:t>6/8/2020</a:t>
+              <a:t>7/8/2020</a:t>
             </a:fld>
             <a:endParaRPr lang="el-GR"/>
           </a:p>
@@ -4349,7 +4349,7 @@
         </p:spPr>
         <p:txBody>
           <a:bodyPr>
-            <a:normAutofit fontScale="92500" lnSpcReduction="20000"/>
+            <a:normAutofit fontScale="77500" lnSpcReduction="20000"/>
           </a:bodyPr>
           <a:lstStyle/>
           <a:p>
@@ -4371,7 +4371,19 @@
             <a:pPr marL="0" indent="0">
               <a:buNone/>
             </a:pPr>
-            <a:endParaRPr lang="el-GR" dirty="0"/>
+            <a:endParaRPr lang="en-US" dirty="0"/>
+          </a:p>
+          <a:p>
+            <a:pPr marL="0" indent="0">
+              <a:buNone/>
+            </a:pPr>
+            <a:endParaRPr lang="en-US" dirty="0"/>
+          </a:p>
+          <a:p>
+            <a:pPr marL="0" indent="0">
+              <a:buNone/>
+            </a:pPr>
+            <a:endParaRPr lang="en-US" dirty="0"/>
           </a:p>
           <a:p>
             <a:pPr marL="0" indent="0">
@@ -4413,7 +4425,7 @@
             </a:r>
             <a:r>
               <a:rPr lang="en-US" dirty="0"/>
-              <a:t>&gt; , &lt;</a:t>
+              <a:t>&gt; ,&lt;</a:t>
             </a:r>
             <a:r>
               <a:rPr lang="en-US" dirty="0" err="1"/>
@@ -4429,7 +4441,23 @@
             </a:r>
             <a:r>
               <a:rPr lang="en-US" dirty="0"/>
-              <a:t>&lt;country&gt; .</a:t>
+              <a:t>&lt;country&gt;</a:t>
+            </a:r>
+            <a:r>
+              <a:rPr lang="el-GR" dirty="0"/>
+              <a:t>,</a:t>
+            </a:r>
+            <a:r>
+              <a:rPr lang="en-US" dirty="0"/>
+              <a:t> &lt;condition&gt; ,&lt;</a:t>
+            </a:r>
+            <a:r>
+              <a:rPr lang="en-US" dirty="0" err="1"/>
+              <a:t>mesh_term</a:t>
+            </a:r>
+            <a:r>
+              <a:rPr lang="en-US" dirty="0"/>
+              <a:t>&gt; .</a:t>
             </a:r>
             <a:endParaRPr lang="el-GR" dirty="0"/>
           </a:p>
@@ -4546,10 +4574,10 @@
       </p:sp>
       <p:pic>
         <p:nvPicPr>
-          <p:cNvPr id="5" name="Picture 4">
-            <a:extLst>
-              <a:ext uri="{FF2B5EF4-FFF2-40B4-BE49-F238E27FC236}">
-                <a16:creationId xmlns:a16="http://schemas.microsoft.com/office/drawing/2014/main" id="{394313EF-90AB-421A-A2D7-2D0F3A475334}"/>
+          <p:cNvPr id="8" name="Picture 7">
+            <a:extLst>
+              <a:ext uri="{FF2B5EF4-FFF2-40B4-BE49-F238E27FC236}">
+                <a16:creationId xmlns:a16="http://schemas.microsoft.com/office/drawing/2014/main" id="{9E165F5A-C112-4455-BBBC-E2528F499E68}"/>
               </a:ext>
             </a:extLst>
           </p:cNvPr>
@@ -4572,8 +4600,8 @@
         </p:blipFill>
         <p:spPr>
           <a:xfrm>
-            <a:off x="2807677" y="1801528"/>
-            <a:ext cx="5872090" cy="1219509"/>
+            <a:off x="1536093" y="1690688"/>
+            <a:ext cx="8249801" cy="1918607"/>
           </a:xfrm>
           <a:prstGeom prst="rect">
             <a:avLst/>
@@ -4915,7 +4943,7 @@
         <p:spPr/>
         <p:txBody>
           <a:bodyPr>
-            <a:normAutofit fontScale="92500" lnSpcReduction="20000"/>
+            <a:normAutofit fontScale="70000" lnSpcReduction="20000"/>
           </a:bodyPr>
           <a:lstStyle/>
           <a:p>
@@ -4987,7 +5015,7 @@
             </a:pPr>
             <a:r>
               <a:rPr lang="en-US" sz="2200" dirty="0"/>
-              <a:t>FROM country c join trials t on </a:t>
+              <a:t>FROM `country` c join `trials` t on </a:t>
             </a:r>
             <a:r>
               <a:rPr lang="en-US" sz="2200" dirty="0" err="1"/>
@@ -5001,6 +5029,52 @@
               <a:rPr lang="en-US" sz="2200" dirty="0" err="1"/>
               <a:t>t.nct_id</a:t>
             </a:r>
+            <a:r>
+              <a:rPr lang="en-US" sz="2200" dirty="0"/>
+              <a:t>   join `condition` co on </a:t>
+            </a:r>
+            <a:r>
+              <a:rPr lang="en-US" sz="2200" dirty="0" err="1"/>
+              <a:t>c.nct_id</a:t>
+            </a:r>
+            <a:r>
+              <a:rPr lang="en-US" sz="2200" dirty="0"/>
+              <a:t>=</a:t>
+            </a:r>
+            <a:r>
+              <a:rPr lang="en-US" sz="2200" dirty="0" err="1"/>
+              <a:t>co.nct_id</a:t>
+            </a:r>
+            <a:endParaRPr lang="en-US" sz="2200" dirty="0"/>
+          </a:p>
+          <a:p>
+            <a:pPr marL="0" indent="0">
+              <a:buNone/>
+            </a:pPr>
+            <a:r>
+              <a:rPr lang="en-US" sz="2200" dirty="0"/>
+              <a:t> 	             join `</a:t>
+            </a:r>
+            <a:r>
+              <a:rPr lang="en-US" sz="2200" dirty="0" err="1"/>
+              <a:t>mesh_term</a:t>
+            </a:r>
+            <a:r>
+              <a:rPr lang="en-US" sz="2200" dirty="0"/>
+              <a:t>` mt on </a:t>
+            </a:r>
+            <a:r>
+              <a:rPr lang="en-US" sz="2200" dirty="0" err="1"/>
+              <a:t>c.nct_id</a:t>
+            </a:r>
+            <a:r>
+              <a:rPr lang="en-US" sz="2200" dirty="0"/>
+              <a:t> =</a:t>
+            </a:r>
+            <a:r>
+              <a:rPr lang="en-US" sz="2200" dirty="0" err="1"/>
+              <a:t>mt.nct_id</a:t>
+            </a:r>
             <a:endParaRPr lang="en-US" sz="2200" dirty="0"/>
           </a:p>
           <a:p>
@@ -5017,7 +5091,7 @@
             </a:r>
             <a:r>
               <a:rPr lang="en-US" sz="2200" dirty="0"/>
-              <a:t> LIKE  “%input%”, </a:t>
+              <a:t> LIKE  “%input%” or </a:t>
             </a:r>
             <a:r>
               <a:rPr lang="en-US" sz="2200" dirty="0" err="1"/>
@@ -5025,7 +5099,24 @@
             </a:r>
             <a:r>
               <a:rPr lang="en-US" sz="2200" dirty="0"/>
-              <a:t> LIKE  “%input%”, acronym LIKE  “%input%” </a:t>
+              <a:t> LIKE  “%input%” or acronym LIKE  “%input%” or term LIKE “%input%” or                     </a:t>
+            </a:r>
+          </a:p>
+          <a:p>
+            <a:pPr marL="0" indent="0">
+              <a:buNone/>
+            </a:pPr>
+            <a:r>
+              <a:rPr lang="en-US" sz="2200" dirty="0"/>
+              <a:t>              </a:t>
+            </a:r>
+            <a:r>
+              <a:rPr lang="en-US" sz="2200" dirty="0" err="1"/>
+              <a:t>cond</a:t>
+            </a:r>
+            <a:r>
+              <a:rPr lang="en-US" sz="2200" dirty="0"/>
+              <a:t> LIKE “%input%”</a:t>
             </a:r>
           </a:p>
           <a:p>

</xml_diff>

<commit_message>
changed db schema, query and presentation
</commit_message>
<xml_diff>
--- a/documentation/IaA_Project_Ρούσσης_Δημήτριος_el17408.pptx
+++ b/documentation/IaA_Project_Ρούσσης_Δημήτριος_el17408.pptx
@@ -270,7 +270,7 @@
           <a:p>
             <a:fld id="{79BF2183-8578-4011-9672-36CA47CFE6D5}" type="datetimeFigureOut">
               <a:rPr lang="el-GR" smtClean="0"/>
-              <a:t>7/8/2020</a:t>
+              <a:t>8/8/2020</a:t>
             </a:fld>
             <a:endParaRPr lang="el-GR"/>
           </a:p>
@@ -470,7 +470,7 @@
           <a:p>
             <a:fld id="{79BF2183-8578-4011-9672-36CA47CFE6D5}" type="datetimeFigureOut">
               <a:rPr lang="el-GR" smtClean="0"/>
-              <a:t>7/8/2020</a:t>
+              <a:t>8/8/2020</a:t>
             </a:fld>
             <a:endParaRPr lang="el-GR"/>
           </a:p>
@@ -680,7 +680,7 @@
           <a:p>
             <a:fld id="{79BF2183-8578-4011-9672-36CA47CFE6D5}" type="datetimeFigureOut">
               <a:rPr lang="el-GR" smtClean="0"/>
-              <a:t>7/8/2020</a:t>
+              <a:t>8/8/2020</a:t>
             </a:fld>
             <a:endParaRPr lang="el-GR"/>
           </a:p>
@@ -880,7 +880,7 @@
           <a:p>
             <a:fld id="{79BF2183-8578-4011-9672-36CA47CFE6D5}" type="datetimeFigureOut">
               <a:rPr lang="el-GR" smtClean="0"/>
-              <a:t>7/8/2020</a:t>
+              <a:t>8/8/2020</a:t>
             </a:fld>
             <a:endParaRPr lang="el-GR"/>
           </a:p>
@@ -1156,7 +1156,7 @@
           <a:p>
             <a:fld id="{79BF2183-8578-4011-9672-36CA47CFE6D5}" type="datetimeFigureOut">
               <a:rPr lang="el-GR" smtClean="0"/>
-              <a:t>7/8/2020</a:t>
+              <a:t>8/8/2020</a:t>
             </a:fld>
             <a:endParaRPr lang="el-GR"/>
           </a:p>
@@ -1424,7 +1424,7 @@
           <a:p>
             <a:fld id="{79BF2183-8578-4011-9672-36CA47CFE6D5}" type="datetimeFigureOut">
               <a:rPr lang="el-GR" smtClean="0"/>
-              <a:t>7/8/2020</a:t>
+              <a:t>8/8/2020</a:t>
             </a:fld>
             <a:endParaRPr lang="el-GR"/>
           </a:p>
@@ -1839,7 +1839,7 @@
           <a:p>
             <a:fld id="{79BF2183-8578-4011-9672-36CA47CFE6D5}" type="datetimeFigureOut">
               <a:rPr lang="el-GR" smtClean="0"/>
-              <a:t>7/8/2020</a:t>
+              <a:t>8/8/2020</a:t>
             </a:fld>
             <a:endParaRPr lang="el-GR"/>
           </a:p>
@@ -1981,7 +1981,7 @@
           <a:p>
             <a:fld id="{79BF2183-8578-4011-9672-36CA47CFE6D5}" type="datetimeFigureOut">
               <a:rPr lang="el-GR" smtClean="0"/>
-              <a:t>7/8/2020</a:t>
+              <a:t>8/8/2020</a:t>
             </a:fld>
             <a:endParaRPr lang="el-GR"/>
           </a:p>
@@ -2094,7 +2094,7 @@
           <a:p>
             <a:fld id="{79BF2183-8578-4011-9672-36CA47CFE6D5}" type="datetimeFigureOut">
               <a:rPr lang="el-GR" smtClean="0"/>
-              <a:t>7/8/2020</a:t>
+              <a:t>8/8/2020</a:t>
             </a:fld>
             <a:endParaRPr lang="el-GR"/>
           </a:p>
@@ -2407,7 +2407,7 @@
           <a:p>
             <a:fld id="{79BF2183-8578-4011-9672-36CA47CFE6D5}" type="datetimeFigureOut">
               <a:rPr lang="el-GR" smtClean="0"/>
-              <a:t>7/8/2020</a:t>
+              <a:t>8/8/2020</a:t>
             </a:fld>
             <a:endParaRPr lang="el-GR"/>
           </a:p>
@@ -2696,7 +2696,7 @@
           <a:p>
             <a:fld id="{79BF2183-8578-4011-9672-36CA47CFE6D5}" type="datetimeFigureOut">
               <a:rPr lang="el-GR" smtClean="0"/>
-              <a:t>7/8/2020</a:t>
+              <a:t>8/8/2020</a:t>
             </a:fld>
             <a:endParaRPr lang="el-GR"/>
           </a:p>
@@ -2939,7 +2939,7 @@
           <a:p>
             <a:fld id="{79BF2183-8578-4011-9672-36CA47CFE6D5}" type="datetimeFigureOut">
               <a:rPr lang="el-GR" smtClean="0"/>
-              <a:t>7/8/2020</a:t>
+              <a:t>8/8/2020</a:t>
             </a:fld>
             <a:endParaRPr lang="el-GR"/>
           </a:p>
@@ -3670,7 +3670,7 @@
                 <a:ea typeface="Calibri" panose="020F0502020204030204" pitchFamily="34" charset="0"/>
                 <a:cs typeface="Times New Roman" panose="02020603050405020304" pitchFamily="18" charset="0"/>
               </a:rPr>
-              <a:t>ΕΞΑΜΗΝΟ 2020 </a:t>
+              <a:t>ΕΑΡΙΝΟ ΕΞΑΜΗΝΟ 2020 </a:t>
             </a:r>
             <a:r>
               <a:rPr lang="el-GR" altLang="el-GR" sz="2000" b="1" dirty="0">
@@ -4027,7 +4027,7 @@
         <p:spPr/>
         <p:txBody>
           <a:bodyPr>
-            <a:normAutofit fontScale="92500" lnSpcReduction="20000"/>
+            <a:normAutofit fontScale="92500" lnSpcReduction="10000"/>
           </a:bodyPr>
           <a:lstStyle/>
           <a:p>
@@ -4126,23 +4126,15 @@
             </a:r>
             <a:r>
               <a:rPr lang="el-GR" dirty="0"/>
-              <a:t>καθώς και τους τίτλους</a:t>
+              <a:t>και το </a:t>
             </a:r>
             <a:r>
               <a:rPr lang="en-US" dirty="0"/>
-              <a:t>, official </a:t>
-            </a:r>
-            <a:r>
-              <a:rPr lang="el-GR" dirty="0"/>
-              <a:t>και </a:t>
-            </a:r>
-            <a:r>
-              <a:rPr lang="en-US" dirty="0"/>
-              <a:t>brief,</a:t>
-            </a:r>
-            <a:r>
-              <a:rPr lang="el-GR" dirty="0"/>
-              <a:t> των κλινικών δοκιμών ώστε να χρησιμοποιηθούν για την εύρεση τους).</a:t>
+              <a:t>condition</a:t>
+            </a:r>
+            <a:r>
+              <a:rPr lang="el-GR" dirty="0"/>
+              <a:t>).</a:t>
             </a:r>
             <a:endParaRPr lang="en-US" dirty="0"/>
           </a:p>
@@ -4349,7 +4341,7 @@
         </p:spPr>
         <p:txBody>
           <a:bodyPr>
-            <a:normAutofit fontScale="77500" lnSpcReduction="20000"/>
+            <a:normAutofit fontScale="85000" lnSpcReduction="20000"/>
           </a:bodyPr>
           <a:lstStyle/>
           <a:p>
@@ -4417,47 +4409,15 @@
             </a:r>
             <a:r>
               <a:rPr lang="en-US" dirty="0"/>
-              <a:t>&gt;, &lt;</a:t>
-            </a:r>
-            <a:r>
-              <a:rPr lang="en-US" dirty="0" err="1"/>
-              <a:t>official_title</a:t>
+              <a:t>&gt;, &lt;country&gt;</a:t>
+            </a:r>
+            <a:r>
+              <a:rPr lang="el-GR" dirty="0"/>
+              <a:t>,</a:t>
             </a:r>
             <a:r>
               <a:rPr lang="en-US" dirty="0"/>
-              <a:t>&gt; ,&lt;</a:t>
-            </a:r>
-            <a:r>
-              <a:rPr lang="en-US" dirty="0" err="1"/>
-              <a:t>brief_title</a:t>
-            </a:r>
-            <a:r>
-              <a:rPr lang="en-US" dirty="0"/>
-              <a:t>&gt;, &lt;acronym&gt;</a:t>
-            </a:r>
-            <a:r>
-              <a:rPr lang="el-GR" dirty="0"/>
-              <a:t>, </a:t>
-            </a:r>
-            <a:r>
-              <a:rPr lang="en-US" dirty="0"/>
-              <a:t>&lt;country&gt;</a:t>
-            </a:r>
-            <a:r>
-              <a:rPr lang="el-GR" dirty="0"/>
-              <a:t>,</a:t>
-            </a:r>
-            <a:r>
-              <a:rPr lang="en-US" dirty="0"/>
-              <a:t> &lt;condition&gt; ,&lt;</a:t>
-            </a:r>
-            <a:r>
-              <a:rPr lang="en-US" dirty="0" err="1"/>
-              <a:t>mesh_term</a:t>
-            </a:r>
-            <a:r>
-              <a:rPr lang="en-US" dirty="0"/>
-              <a:t>&gt; .</a:t>
+              <a:t> &lt;condition&gt;.</a:t>
             </a:r>
             <a:endParaRPr lang="el-GR" dirty="0"/>
           </a:p>
@@ -4574,10 +4534,10 @@
       </p:sp>
       <p:pic>
         <p:nvPicPr>
-          <p:cNvPr id="8" name="Picture 7">
-            <a:extLst>
-              <a:ext uri="{FF2B5EF4-FFF2-40B4-BE49-F238E27FC236}">
-                <a16:creationId xmlns:a16="http://schemas.microsoft.com/office/drawing/2014/main" id="{9E165F5A-C112-4455-BBBC-E2528F499E68}"/>
+          <p:cNvPr id="5" name="Picture 4">
+            <a:extLst>
+              <a:ext uri="{FF2B5EF4-FFF2-40B4-BE49-F238E27FC236}">
+                <a16:creationId xmlns:a16="http://schemas.microsoft.com/office/drawing/2014/main" id="{60F3D038-CC33-4D4D-BD09-17C8DE11E40F}"/>
               </a:ext>
             </a:extLst>
           </p:cNvPr>
@@ -4600,8 +4560,8 @@
         </p:blipFill>
         <p:spPr>
           <a:xfrm>
-            <a:off x="1536093" y="1690688"/>
-            <a:ext cx="8249801" cy="1918607"/>
+            <a:off x="1962074" y="1857571"/>
+            <a:ext cx="6190476" cy="1571429"/>
           </a:xfrm>
           <a:prstGeom prst="rect">
             <a:avLst/>
@@ -4943,7 +4903,7 @@
         <p:spPr/>
         <p:txBody>
           <a:bodyPr>
-            <a:normAutofit fontScale="70000" lnSpcReduction="20000"/>
+            <a:normAutofit fontScale="92500" lnSpcReduction="20000"/>
           </a:bodyPr>
           <a:lstStyle/>
           <a:p>
@@ -4992,8 +4952,20 @@
               <a:buNone/>
             </a:pPr>
             <a:r>
+              <a:rPr lang="en-US" sz="2200" dirty="0">
+                <a:effectLst>
+                  <a:outerShdw blurRad="38100" dist="38100" dir="2700000" algn="tl">
+                    <a:srgbClr val="000000">
+                      <a:alpha val="43137"/>
+                    </a:srgbClr>
+                  </a:outerShdw>
+                </a:effectLst>
+              </a:rPr>
+              <a:t>SELECT</a:t>
+            </a:r>
+            <a:r>
               <a:rPr lang="en-US" sz="2200" dirty="0"/>
-              <a:t>SELECT </a:t>
+              <a:t> </a:t>
             </a:r>
             <a:r>
               <a:rPr lang="en-US" sz="2200" dirty="0" err="1"/>
@@ -5014,8 +4986,20 @@
               <a:buNone/>
             </a:pPr>
             <a:r>
+              <a:rPr lang="en-US" sz="2200" dirty="0">
+                <a:effectLst>
+                  <a:outerShdw blurRad="38100" dist="38100" dir="2700000" algn="tl">
+                    <a:srgbClr val="000000">
+                      <a:alpha val="43137"/>
+                    </a:srgbClr>
+                  </a:outerShdw>
+                </a:effectLst>
+              </a:rPr>
+              <a:t>FROM</a:t>
+            </a:r>
+            <a:r>
               <a:rPr lang="en-US" sz="2200" dirty="0"/>
-              <a:t>FROM `country` c join `trials` t on </a:t>
+              <a:t> `country` c join `condition` t on </a:t>
             </a:r>
             <a:r>
               <a:rPr lang="en-US" sz="2200" dirty="0" err="1"/>
@@ -5031,84 +5015,28 @@
             </a:r>
             <a:r>
               <a:rPr lang="en-US" sz="2200" dirty="0"/>
-              <a:t>   join `condition` co on </a:t>
-            </a:r>
-            <a:r>
-              <a:rPr lang="en-US" sz="2200" dirty="0" err="1"/>
-              <a:t>c.nct_id</a:t>
+              <a:t>   </a:t>
+            </a:r>
+          </a:p>
+          <a:p>
+            <a:pPr marL="0" indent="0">
+              <a:buNone/>
+            </a:pPr>
+            <a:r>
+              <a:rPr lang="en-US" sz="2200" dirty="0">
+                <a:effectLst>
+                  <a:outerShdw blurRad="38100" dist="38100" dir="2700000" algn="tl">
+                    <a:srgbClr val="000000">
+                      <a:alpha val="43137"/>
+                    </a:srgbClr>
+                  </a:outerShdw>
+                </a:effectLst>
+              </a:rPr>
+              <a:t>WHERE</a:t>
             </a:r>
             <a:r>
               <a:rPr lang="en-US" sz="2200" dirty="0"/>
-              <a:t>=</a:t>
-            </a:r>
-            <a:r>
-              <a:rPr lang="en-US" sz="2200" dirty="0" err="1"/>
-              <a:t>co.nct_id</a:t>
-            </a:r>
-            <a:endParaRPr lang="en-US" sz="2200" dirty="0"/>
-          </a:p>
-          <a:p>
-            <a:pPr marL="0" indent="0">
-              <a:buNone/>
-            </a:pPr>
-            <a:r>
-              <a:rPr lang="en-US" sz="2200" dirty="0"/>
-              <a:t> 	             join `</a:t>
-            </a:r>
-            <a:r>
-              <a:rPr lang="en-US" sz="2200" dirty="0" err="1"/>
-              <a:t>mesh_term</a:t>
-            </a:r>
-            <a:r>
-              <a:rPr lang="en-US" sz="2200" dirty="0"/>
-              <a:t>` mt on </a:t>
-            </a:r>
-            <a:r>
-              <a:rPr lang="en-US" sz="2200" dirty="0" err="1"/>
-              <a:t>c.nct_id</a:t>
-            </a:r>
-            <a:r>
-              <a:rPr lang="en-US" sz="2200" dirty="0"/>
-              <a:t> =</a:t>
-            </a:r>
-            <a:r>
-              <a:rPr lang="en-US" sz="2200" dirty="0" err="1"/>
-              <a:t>mt.nct_id</a:t>
-            </a:r>
-            <a:endParaRPr lang="en-US" sz="2200" dirty="0"/>
-          </a:p>
-          <a:p>
-            <a:pPr marL="0" indent="0">
-              <a:buNone/>
-            </a:pPr>
-            <a:r>
-              <a:rPr lang="en-US" sz="2200" dirty="0"/>
-              <a:t>WHERE </a:t>
-            </a:r>
-            <a:r>
-              <a:rPr lang="en-US" sz="2200" dirty="0" err="1"/>
-              <a:t>official_title</a:t>
-            </a:r>
-            <a:r>
-              <a:rPr lang="en-US" sz="2200" dirty="0"/>
-              <a:t> LIKE  “%input%” or </a:t>
-            </a:r>
-            <a:r>
-              <a:rPr lang="en-US" sz="2200" dirty="0" err="1"/>
-              <a:t>brief_title</a:t>
-            </a:r>
-            <a:r>
-              <a:rPr lang="en-US" sz="2200" dirty="0"/>
-              <a:t> LIKE  “%input%” or acronym LIKE  “%input%” or term LIKE “%input%” or                     </a:t>
-            </a:r>
-          </a:p>
-          <a:p>
-            <a:pPr marL="0" indent="0">
-              <a:buNone/>
-            </a:pPr>
-            <a:r>
-              <a:rPr lang="en-US" sz="2200" dirty="0"/>
-              <a:t>              </a:t>
+              <a:t>  </a:t>
             </a:r>
             <a:r>
               <a:rPr lang="en-US" sz="2200" dirty="0" err="1"/>
@@ -5124,7 +5052,15 @@
               <a:buNone/>
             </a:pPr>
             <a:r>
-              <a:rPr lang="en-US" sz="2200" dirty="0"/>
+              <a:rPr lang="en-US" sz="2200" dirty="0">
+                <a:effectLst>
+                  <a:outerShdw blurRad="38100" dist="38100" dir="2700000" algn="tl">
+                    <a:srgbClr val="000000">
+                      <a:alpha val="43137"/>
+                    </a:srgbClr>
+                  </a:outerShdw>
+                </a:effectLst>
+              </a:rPr>
               <a:t>GROUP BY </a:t>
             </a:r>
             <a:r>
@@ -5138,7 +5074,15 @@
               <a:buNone/>
             </a:pPr>
             <a:r>
-              <a:rPr lang="en-US" sz="2200" dirty="0"/>
+              <a:rPr lang="en-US" sz="2200" dirty="0">
+                <a:effectLst>
+                  <a:outerShdw blurRad="38100" dist="38100" dir="2700000" algn="tl">
+                    <a:srgbClr val="000000">
+                      <a:alpha val="43137"/>
+                    </a:srgbClr>
+                  </a:outerShdw>
+                </a:effectLst>
+              </a:rPr>
               <a:t>ORDER BY </a:t>
             </a:r>
             <a:r>

</xml_diff>

<commit_message>
changed pptx and readme.md
</commit_message>
<xml_diff>
--- a/documentation/IaA_Project_Ρούσσης_Δημήτριος_el17408.pptx
+++ b/documentation/IaA_Project_Ρούσσης_Δημήτριος_el17408.pptx
@@ -10,11 +10,10 @@
     <p:sldId id="258" r:id="rId4"/>
     <p:sldId id="259" r:id="rId5"/>
     <p:sldId id="260" r:id="rId6"/>
-    <p:sldId id="261" r:id="rId7"/>
-    <p:sldId id="262" r:id="rId8"/>
-    <p:sldId id="263" r:id="rId9"/>
-    <p:sldId id="264" r:id="rId10"/>
-    <p:sldId id="265" r:id="rId11"/>
+    <p:sldId id="262" r:id="rId7"/>
+    <p:sldId id="263" r:id="rId8"/>
+    <p:sldId id="264" r:id="rId9"/>
+    <p:sldId id="265" r:id="rId10"/>
   </p:sldIdLst>
   <p:sldSz cx="12192000" cy="6858000"/>
   <p:notesSz cx="6858000" cy="9144000"/>
@@ -270,7 +269,7 @@
           <a:p>
             <a:fld id="{79BF2183-8578-4011-9672-36CA47CFE6D5}" type="datetimeFigureOut">
               <a:rPr lang="el-GR" smtClean="0"/>
-              <a:t>8/8/2020</a:t>
+              <a:t>9/8/2020</a:t>
             </a:fld>
             <a:endParaRPr lang="el-GR"/>
           </a:p>
@@ -470,7 +469,7 @@
           <a:p>
             <a:fld id="{79BF2183-8578-4011-9672-36CA47CFE6D5}" type="datetimeFigureOut">
               <a:rPr lang="el-GR" smtClean="0"/>
-              <a:t>8/8/2020</a:t>
+              <a:t>9/8/2020</a:t>
             </a:fld>
             <a:endParaRPr lang="el-GR"/>
           </a:p>
@@ -680,7 +679,7 @@
           <a:p>
             <a:fld id="{79BF2183-8578-4011-9672-36CA47CFE6D5}" type="datetimeFigureOut">
               <a:rPr lang="el-GR" smtClean="0"/>
-              <a:t>8/8/2020</a:t>
+              <a:t>9/8/2020</a:t>
             </a:fld>
             <a:endParaRPr lang="el-GR"/>
           </a:p>
@@ -880,7 +879,7 @@
           <a:p>
             <a:fld id="{79BF2183-8578-4011-9672-36CA47CFE6D5}" type="datetimeFigureOut">
               <a:rPr lang="el-GR" smtClean="0"/>
-              <a:t>8/8/2020</a:t>
+              <a:t>9/8/2020</a:t>
             </a:fld>
             <a:endParaRPr lang="el-GR"/>
           </a:p>
@@ -1156,7 +1155,7 @@
           <a:p>
             <a:fld id="{79BF2183-8578-4011-9672-36CA47CFE6D5}" type="datetimeFigureOut">
               <a:rPr lang="el-GR" smtClean="0"/>
-              <a:t>8/8/2020</a:t>
+              <a:t>9/8/2020</a:t>
             </a:fld>
             <a:endParaRPr lang="el-GR"/>
           </a:p>
@@ -1424,7 +1423,7 @@
           <a:p>
             <a:fld id="{79BF2183-8578-4011-9672-36CA47CFE6D5}" type="datetimeFigureOut">
               <a:rPr lang="el-GR" smtClean="0"/>
-              <a:t>8/8/2020</a:t>
+              <a:t>9/8/2020</a:t>
             </a:fld>
             <a:endParaRPr lang="el-GR"/>
           </a:p>
@@ -1839,7 +1838,7 @@
           <a:p>
             <a:fld id="{79BF2183-8578-4011-9672-36CA47CFE6D5}" type="datetimeFigureOut">
               <a:rPr lang="el-GR" smtClean="0"/>
-              <a:t>8/8/2020</a:t>
+              <a:t>9/8/2020</a:t>
             </a:fld>
             <a:endParaRPr lang="el-GR"/>
           </a:p>
@@ -1981,7 +1980,7 @@
           <a:p>
             <a:fld id="{79BF2183-8578-4011-9672-36CA47CFE6D5}" type="datetimeFigureOut">
               <a:rPr lang="el-GR" smtClean="0"/>
-              <a:t>8/8/2020</a:t>
+              <a:t>9/8/2020</a:t>
             </a:fld>
             <a:endParaRPr lang="el-GR"/>
           </a:p>
@@ -2094,7 +2093,7 @@
           <a:p>
             <a:fld id="{79BF2183-8578-4011-9672-36CA47CFE6D5}" type="datetimeFigureOut">
               <a:rPr lang="el-GR" smtClean="0"/>
-              <a:t>8/8/2020</a:t>
+              <a:t>9/8/2020</a:t>
             </a:fld>
             <a:endParaRPr lang="el-GR"/>
           </a:p>
@@ -2407,7 +2406,7 @@
           <a:p>
             <a:fld id="{79BF2183-8578-4011-9672-36CA47CFE6D5}" type="datetimeFigureOut">
               <a:rPr lang="el-GR" smtClean="0"/>
-              <a:t>8/8/2020</a:t>
+              <a:t>9/8/2020</a:t>
             </a:fld>
             <a:endParaRPr lang="el-GR"/>
           </a:p>
@@ -2696,7 +2695,7 @@
           <a:p>
             <a:fld id="{79BF2183-8578-4011-9672-36CA47CFE6D5}" type="datetimeFigureOut">
               <a:rPr lang="el-GR" smtClean="0"/>
-              <a:t>8/8/2020</a:t>
+              <a:t>9/8/2020</a:t>
             </a:fld>
             <a:endParaRPr lang="el-GR"/>
           </a:p>
@@ -2939,7 +2938,7 @@
           <a:p>
             <a:fld id="{79BF2183-8578-4011-9672-36CA47CFE6D5}" type="datetimeFigureOut">
               <a:rPr lang="el-GR" smtClean="0"/>
-              <a:t>8/8/2020</a:t>
+              <a:t>9/8/2020</a:t>
             </a:fld>
             <a:endParaRPr lang="el-GR"/>
           </a:p>
@@ -3782,187 +3781,6 @@
 </p:sld>
 </file>
 
-<file path=ppt/slides/slide10.xml><?xml version="1.0" encoding="utf-8"?>
-<p:sld xmlns:a="http://schemas.openxmlformats.org/drawingml/2006/main" xmlns:r="http://schemas.openxmlformats.org/officeDocument/2006/relationships" xmlns:p="http://schemas.openxmlformats.org/presentationml/2006/main">
-  <p:cSld>
-    <p:spTree>
-      <p:nvGrpSpPr>
-        <p:cNvPr id="1" name=""/>
-        <p:cNvGrpSpPr/>
-        <p:nvPr/>
-      </p:nvGrpSpPr>
-      <p:grpSpPr>
-        <a:xfrm>
-          <a:off x="0" y="0"/>
-          <a:ext cx="0" cy="0"/>
-          <a:chOff x="0" y="0"/>
-          <a:chExt cx="0" cy="0"/>
-        </a:xfrm>
-      </p:grpSpPr>
-      <p:sp>
-        <p:nvSpPr>
-          <p:cNvPr id="2" name="Title 1">
-            <a:extLst>
-              <a:ext uri="{FF2B5EF4-FFF2-40B4-BE49-F238E27FC236}">
-                <a16:creationId xmlns:a16="http://schemas.microsoft.com/office/drawing/2014/main" id="{0B7E96FC-C6AC-4E56-9661-EE99DA898731}"/>
-              </a:ext>
-            </a:extLst>
-          </p:cNvPr>
-          <p:cNvSpPr>
-            <a:spLocks noGrp="1"/>
-          </p:cNvSpPr>
-          <p:nvPr>
-            <p:ph type="title"/>
-          </p:nvPr>
-        </p:nvSpPr>
-        <p:spPr/>
-        <p:txBody>
-          <a:bodyPr/>
-          <a:lstStyle/>
-          <a:p>
-            <a:r>
-              <a:rPr lang="el-GR" dirty="0"/>
-              <a:t>Παραδείγματα(3)</a:t>
-            </a:r>
-          </a:p>
-        </p:txBody>
-      </p:sp>
-      <p:sp>
-        <p:nvSpPr>
-          <p:cNvPr id="3" name="Content Placeholder 2">
-            <a:extLst>
-              <a:ext uri="{FF2B5EF4-FFF2-40B4-BE49-F238E27FC236}">
-                <a16:creationId xmlns:a16="http://schemas.microsoft.com/office/drawing/2014/main" id="{40107A26-F93A-4591-8343-3D26146D46D8}"/>
-              </a:ext>
-            </a:extLst>
-          </p:cNvPr>
-          <p:cNvSpPr>
-            <a:spLocks noGrp="1"/>
-          </p:cNvSpPr>
-          <p:nvPr>
-            <p:ph idx="1"/>
-          </p:nvPr>
-        </p:nvSpPr>
-        <p:spPr/>
-        <p:txBody>
-          <a:bodyPr/>
-          <a:lstStyle/>
-          <a:p>
-            <a:pPr marL="0" indent="0">
-              <a:buNone/>
-            </a:pPr>
-            <a:r>
-              <a:rPr lang="el-GR" dirty="0"/>
-              <a:t>Αναζήτηση για</a:t>
-            </a:r>
-          </a:p>
-          <a:p>
-            <a:pPr marL="0" indent="0">
-              <a:buNone/>
-            </a:pPr>
-            <a:r>
-              <a:rPr lang="el-GR" dirty="0"/>
-              <a:t>την ασθένεια</a:t>
-            </a:r>
-          </a:p>
-          <a:p>
-            <a:pPr marL="0" indent="0">
-              <a:buNone/>
-            </a:pPr>
-            <a:r>
-              <a:rPr lang="en-US" dirty="0" err="1"/>
-              <a:t>Myelofibr</a:t>
-            </a:r>
-            <a:r>
-              <a:rPr lang="el-GR"/>
-              <a:t>ο</a:t>
-            </a:r>
-            <a:r>
-              <a:rPr lang="en-US"/>
-              <a:t>sis</a:t>
-            </a:r>
-            <a:r>
-              <a:rPr lang="el-GR" dirty="0"/>
-              <a:t>,</a:t>
-            </a:r>
-            <a:endParaRPr lang="en-US" dirty="0"/>
-          </a:p>
-          <a:p>
-            <a:pPr marL="0" indent="0">
-              <a:buNone/>
-            </a:pPr>
-            <a:r>
-              <a:rPr lang="el-GR" dirty="0"/>
-              <a:t>σε </a:t>
-            </a:r>
-            <a:r>
-              <a:rPr lang="en-US" dirty="0"/>
-              <a:t>json</a:t>
-            </a:r>
-          </a:p>
-          <a:p>
-            <a:pPr marL="0" indent="0">
-              <a:buNone/>
-            </a:pPr>
-            <a:r>
-              <a:rPr lang="el-GR" dirty="0"/>
-              <a:t>παρουσίαση.</a:t>
-            </a:r>
-          </a:p>
-          <a:p>
-            <a:endParaRPr lang="el-GR" dirty="0"/>
-          </a:p>
-        </p:txBody>
-      </p:sp>
-      <p:pic>
-        <p:nvPicPr>
-          <p:cNvPr id="5" name="Picture 4">
-            <a:extLst>
-              <a:ext uri="{FF2B5EF4-FFF2-40B4-BE49-F238E27FC236}">
-                <a16:creationId xmlns:a16="http://schemas.microsoft.com/office/drawing/2014/main" id="{00A28EEA-0473-4D8A-BF91-44C75959A76F}"/>
-              </a:ext>
-            </a:extLst>
-          </p:cNvPr>
-          <p:cNvPicPr>
-            <a:picLocks noChangeAspect="1"/>
-          </p:cNvPicPr>
-          <p:nvPr/>
-        </p:nvPicPr>
-        <p:blipFill>
-          <a:blip r:embed="rId2">
-            <a:extLst>
-              <a:ext uri="{28A0092B-C50C-407E-A947-70E740481C1C}">
-                <a14:useLocalDpi xmlns:a14="http://schemas.microsoft.com/office/drawing/2010/main" val="0"/>
-              </a:ext>
-            </a:extLst>
-          </a:blip>
-          <a:stretch>
-            <a:fillRect/>
-          </a:stretch>
-        </p:blipFill>
-        <p:spPr>
-          <a:xfrm>
-            <a:off x="3122626" y="1825625"/>
-            <a:ext cx="8231174" cy="4312708"/>
-          </a:xfrm>
-          <a:prstGeom prst="rect">
-            <a:avLst/>
-          </a:prstGeom>
-        </p:spPr>
-      </p:pic>
-    </p:spTree>
-    <p:extLst>
-      <p:ext uri="{BB962C8B-B14F-4D97-AF65-F5344CB8AC3E}">
-        <p14:creationId xmlns:p14="http://schemas.microsoft.com/office/powerpoint/2010/main" val="3916805204"/>
-      </p:ext>
-    </p:extLst>
-  </p:cSld>
-  <p:clrMapOvr>
-    <a:masterClrMapping/>
-  </p:clrMapOvr>
-</p:sld>
-</file>
-
 <file path=ppt/slides/slide2.xml><?xml version="1.0" encoding="utf-8"?>
 <p:sld xmlns:a="http://schemas.openxmlformats.org/drawingml/2006/main" xmlns:r="http://schemas.openxmlformats.org/officeDocument/2006/relationships" xmlns:p="http://schemas.openxmlformats.org/presentationml/2006/main">
   <p:cSld>
@@ -4637,88 +4455,107 @@
               <a:t>- </a:t>
             </a:r>
             <a:r>
+              <a:rPr lang="en-US" dirty="0" err="1"/>
+              <a:t>index.jsp</a:t>
+            </a:r>
+            <a:endParaRPr lang="el-GR" dirty="0"/>
+          </a:p>
+        </p:txBody>
+      </p:sp>
+      <p:sp>
+        <p:nvSpPr>
+          <p:cNvPr id="3" name="Content Placeholder 2">
+            <a:extLst>
+              <a:ext uri="{FF2B5EF4-FFF2-40B4-BE49-F238E27FC236}">
+                <a16:creationId xmlns:a16="http://schemas.microsoft.com/office/drawing/2014/main" id="{38DE55E5-E12B-4333-ADBC-8FF555FDD3AE}"/>
+              </a:ext>
+            </a:extLst>
+          </p:cNvPr>
+          <p:cNvSpPr>
+            <a:spLocks noGrp="1"/>
+          </p:cNvSpPr>
+          <p:nvPr>
+            <p:ph idx="1"/>
+          </p:nvPr>
+        </p:nvSpPr>
+        <p:spPr/>
+        <p:txBody>
+          <a:bodyPr>
+            <a:normAutofit fontScale="92500" lnSpcReduction="10000"/>
+          </a:bodyPr>
+          <a:lstStyle/>
+          <a:p>
+            <a:pPr marL="0" indent="0">
+              <a:buNone/>
+            </a:pPr>
+            <a:r>
+              <a:rPr lang="el-GR" dirty="0"/>
+              <a:t>Η αρχική σελίδα αποτελείτε από μία φόρμα η οποία περιέχει ένα </a:t>
+            </a:r>
+            <a:r>
               <a:rPr lang="en-US" dirty="0"/>
-              <a:t>index.html</a:t>
-            </a:r>
-            <a:endParaRPr lang="el-GR" dirty="0"/>
-          </a:p>
-        </p:txBody>
-      </p:sp>
-      <p:sp>
-        <p:nvSpPr>
-          <p:cNvPr id="3" name="Content Placeholder 2">
-            <a:extLst>
-              <a:ext uri="{FF2B5EF4-FFF2-40B4-BE49-F238E27FC236}">
-                <a16:creationId xmlns:a16="http://schemas.microsoft.com/office/drawing/2014/main" id="{38DE55E5-E12B-4333-ADBC-8FF555FDD3AE}"/>
-              </a:ext>
-            </a:extLst>
-          </p:cNvPr>
-          <p:cNvSpPr>
-            <a:spLocks noGrp="1"/>
-          </p:cNvSpPr>
-          <p:nvPr>
-            <p:ph idx="1"/>
-          </p:nvPr>
-        </p:nvSpPr>
-        <p:spPr/>
-        <p:txBody>
-          <a:bodyPr/>
-          <a:lstStyle/>
+              <a:t>search bar </a:t>
+            </a:r>
+            <a:r>
+              <a:rPr lang="el-GR" dirty="0"/>
+              <a:t>και 2 </a:t>
+            </a:r>
+            <a:r>
+              <a:rPr lang="en-US" dirty="0"/>
+              <a:t>radio buttons </a:t>
+            </a:r>
+            <a:r>
+              <a:rPr lang="el-GR" dirty="0"/>
+              <a:t>για επιλογή του </a:t>
+            </a:r>
+            <a:r>
+              <a:rPr lang="en-US" dirty="0"/>
+              <a:t>format </a:t>
+            </a:r>
+            <a:r>
+              <a:rPr lang="el-GR" dirty="0"/>
+              <a:t>παρουσίασης των δεδομένων.</a:t>
+            </a:r>
+          </a:p>
           <a:p>
             <a:pPr marL="0" indent="0">
               <a:buNone/>
             </a:pPr>
             <a:r>
               <a:rPr lang="el-GR" dirty="0"/>
-              <a:t>Αρχικά δημιουργήσαμε ένα </a:t>
+              <a:t>Η φόρμα αυτή εκτελεί μέθοδο </a:t>
             </a:r>
             <a:r>
               <a:rPr lang="en-US" dirty="0"/>
-              <a:t>http </a:t>
-            </a:r>
-            <a:r>
-              <a:rPr lang="el-GR" dirty="0"/>
-              <a:t>αρχείο </a:t>
+              <a:t>post </a:t>
+            </a:r>
+            <a:r>
+              <a:rPr lang="el-GR" dirty="0"/>
+              <a:t>προς το </a:t>
             </a:r>
             <a:r>
               <a:rPr lang="en-US" dirty="0"/>
-              <a:t>index.html</a:t>
-            </a:r>
-            <a:r>
-              <a:rPr lang="el-GR" dirty="0"/>
-              <a:t>, που ουσιαστικά εχουμε ένα μία φόρμα που περιέχει ένα </a:t>
+              <a:t>servlet</a:t>
+            </a:r>
+            <a:r>
+              <a:rPr lang="el-GR" dirty="0"/>
+              <a:t>, το οποίο είναι υπεύθυνο για το </a:t>
             </a:r>
             <a:r>
               <a:rPr lang="en-US" dirty="0"/>
-              <a:t>“search bar” </a:t>
-            </a:r>
-            <a:r>
-              <a:rPr lang="el-GR" dirty="0"/>
-              <a:t>και δύο </a:t>
+              <a:t>fetch </a:t>
+            </a:r>
+            <a:r>
+              <a:rPr lang="el-GR" dirty="0"/>
+              <a:t>των δεδομένων από την βάση δεδομένων, την τοποθετησή τους σε παραμέτρους στο </a:t>
             </a:r>
             <a:r>
               <a:rPr lang="en-US" dirty="0"/>
-              <a:t>radio buttons (map, json) </a:t>
-            </a:r>
-            <a:r>
-              <a:rPr lang="el-GR" dirty="0"/>
-              <a:t>, για επιλογή του </a:t>
-            </a:r>
-            <a:r>
-              <a:rPr lang="en-US" dirty="0"/>
-              <a:t>format-</a:t>
-            </a:r>
-            <a:r>
-              <a:rPr lang="el-GR" dirty="0"/>
-              <a:t>παρουσίαση</a:t>
-            </a:r>
-            <a:r>
-              <a:rPr lang="en-US" dirty="0"/>
-              <a:t> </a:t>
-            </a:r>
-            <a:r>
-              <a:rPr lang="el-GR" dirty="0"/>
-              <a:t>των δεδομένων. </a:t>
+              <a:t>session </a:t>
+            </a:r>
+            <a:r>
+              <a:rPr lang="el-GR" dirty="0"/>
+              <a:t>καθώς και το καθάρισμα κάποιων δεδομένων.</a:t>
             </a:r>
           </a:p>
           <a:p>
@@ -4903,7 +4740,7 @@
         <p:spPr/>
         <p:txBody>
           <a:bodyPr>
-            <a:normAutofit fontScale="92500" lnSpcReduction="20000"/>
+            <a:normAutofit/>
           </a:bodyPr>
           <a:lstStyle/>
           <a:p>
@@ -4932,15 +4769,27 @@
             </a:r>
             <a:r>
               <a:rPr lang="el-GR" sz="2600" dirty="0"/>
-              <a:t>θα πρέπει να δημιούργηθεί κατάλληλο </a:t>
+              <a:t>θα γίνει μέσω του </a:t>
             </a:r>
             <a:r>
               <a:rPr lang="en-US" sz="2600" dirty="0"/>
-              <a:t>php </a:t>
+              <a:t>servlet </a:t>
             </a:r>
             <a:r>
               <a:rPr lang="el-GR" sz="2600" dirty="0"/>
-              <a:t>αρχείο. Έτσι εκτελώντας το </a:t>
+              <a:t>και συγκεκριμένα μέσω </a:t>
+            </a:r>
+            <a:r>
+              <a:rPr lang="en-US" sz="2600" dirty="0" err="1"/>
+              <a:t>jdbc</a:t>
+            </a:r>
+            <a:r>
+              <a:rPr lang="en-US" sz="2600" dirty="0"/>
+              <a:t> connector</a:t>
+            </a:r>
+            <a:r>
+              <a:rPr lang="el-GR" sz="2600" dirty="0"/>
+              <a:t>. Έτσι εκτελώντας το </a:t>
             </a:r>
             <a:r>
               <a:rPr lang="en-US" sz="2600" dirty="0"/>
@@ -5119,65 +4968,6 @@
               <a:t>παίρνουμε το αποτέλεσμα που ζητείται.</a:t>
             </a:r>
             <a:endParaRPr lang="en-US" sz="2600" dirty="0"/>
-          </a:p>
-          <a:p>
-            <a:pPr marL="0" indent="0">
-              <a:buNone/>
-            </a:pPr>
-            <a:r>
-              <a:rPr lang="el-GR" sz="2600" dirty="0"/>
-              <a:t>Για να μπορέσει να εκτελεστεί ο κώδικας </a:t>
-            </a:r>
-            <a:r>
-              <a:rPr lang="en-US" sz="2600" dirty="0"/>
-              <a:t>php </a:t>
-            </a:r>
-            <a:r>
-              <a:rPr lang="el-GR" sz="2600" dirty="0"/>
-              <a:t>θα πρέπει να προσθεθεί στο </a:t>
-            </a:r>
-            <a:r>
-              <a:rPr lang="en-US" sz="2600" dirty="0"/>
-              <a:t>path </a:t>
-            </a:r>
-            <a:r>
-              <a:rPr lang="el-GR" sz="2600" dirty="0"/>
-              <a:t>κατάλληλο </a:t>
-            </a:r>
-            <a:r>
-              <a:rPr lang="en-US" sz="2600" dirty="0"/>
-              <a:t>variable. </a:t>
-            </a:r>
-            <a:r>
-              <a:rPr lang="el-GR" sz="2600" dirty="0"/>
-              <a:t>Αυτό γίνεται με την εντολή </a:t>
-            </a:r>
-            <a:r>
-              <a:rPr lang="el-GR" dirty="0"/>
-              <a:t>:</a:t>
-            </a:r>
-          </a:p>
-          <a:p>
-            <a:pPr marL="0" indent="0">
-              <a:buNone/>
-            </a:pPr>
-            <a:r>
-              <a:rPr lang="en-US" sz="3300" dirty="0">
-                <a:effectLst>
-                  <a:outerShdw blurRad="38100" dist="38100" dir="2700000" algn="tl">
-                    <a:srgbClr val="000000">
-                      <a:alpha val="43137"/>
-                    </a:srgbClr>
-                  </a:outerShdw>
-                </a:effectLst>
-              </a:rPr>
-              <a:t>set path=%path%; "C:\Programming\xampp\php" </a:t>
-            </a:r>
-            <a:r>
-              <a:rPr lang="en-US" sz="3300" dirty="0"/>
-              <a:t>.</a:t>
-            </a:r>
-            <a:endParaRPr lang="el-GR" sz="3300" dirty="0"/>
           </a:p>
         </p:txBody>
       </p:sp>
@@ -5216,7 +5006,7 @@
           <p:cNvPr id="2" name="Title 1">
             <a:extLst>
               <a:ext uri="{FF2B5EF4-FFF2-40B4-BE49-F238E27FC236}">
-                <a16:creationId xmlns:a16="http://schemas.microsoft.com/office/drawing/2014/main" id="{BE16E0E8-7B54-4354-AB42-E34A2C7A82D4}"/>
+                <a16:creationId xmlns:a16="http://schemas.microsoft.com/office/drawing/2014/main" id="{46B2786A-7BD1-47ED-8298-E415C5ACDFA1}"/>
               </a:ext>
             </a:extLst>
           </p:cNvPr>
@@ -5234,13 +5024,8 @@
           <a:p>
             <a:r>
               <a:rPr lang="el-GR" dirty="0"/>
-              <a:t>Τελικό </a:t>
-            </a:r>
-            <a:r>
-              <a:rPr lang="en-US" dirty="0"/>
-              <a:t>URL</a:t>
-            </a:r>
-            <a:endParaRPr lang="el-GR" dirty="0"/>
+              <a:t>Συνολικά προαπαιτούμενα</a:t>
+            </a:r>
           </a:p>
         </p:txBody>
       </p:sp>
@@ -5249,7 +5034,7 @@
           <p:cNvPr id="3" name="Content Placeholder 2">
             <a:extLst>
               <a:ext uri="{FF2B5EF4-FFF2-40B4-BE49-F238E27FC236}">
-                <a16:creationId xmlns:a16="http://schemas.microsoft.com/office/drawing/2014/main" id="{45B86EDD-3740-4AB1-AD54-D05C6847ACB2}"/>
+                <a16:creationId xmlns:a16="http://schemas.microsoft.com/office/drawing/2014/main" id="{5590F1AB-3D4E-4D9B-9232-0BF563478356}"/>
               </a:ext>
             </a:extLst>
           </p:cNvPr>
@@ -5269,142 +5054,140 @@
               <a:buNone/>
             </a:pPr>
             <a:r>
-              <a:rPr lang="el-GR" dirty="0"/>
-              <a:t>Το </a:t>
-            </a:r>
-            <a:r>
-              <a:rPr lang="en-US" dirty="0" err="1"/>
-              <a:t>url</a:t>
-            </a:r>
-            <a:r>
-              <a:rPr lang="en-US" dirty="0"/>
+              <a:rPr lang="en-US" dirty="0">
+                <a:effectLst>
+                  <a:outerShdw blurRad="38100" dist="38100" dir="2700000" algn="tl">
+                    <a:srgbClr val="000000">
+                      <a:alpha val="43137"/>
+                    </a:srgbClr>
+                  </a:outerShdw>
+                </a:effectLst>
+              </a:rPr>
+              <a:t>pip3 install </a:t>
+            </a:r>
+            <a:r>
+              <a:rPr lang="en-US" dirty="0" err="1">
+                <a:effectLst>
+                  <a:outerShdw blurRad="38100" dist="38100" dir="2700000" algn="tl">
+                    <a:srgbClr val="000000">
+                      <a:alpha val="43137"/>
+                    </a:srgbClr>
+                  </a:outerShdw>
+                </a:effectLst>
+              </a:rPr>
+              <a:t>mysql.connector</a:t>
+            </a:r>
+            <a:r>
+              <a:rPr lang="en-US" dirty="0">
+                <a:effectLst>
+                  <a:outerShdw blurRad="38100" dist="38100" dir="2700000" algn="tl">
+                    <a:srgbClr val="000000">
+                      <a:alpha val="43137"/>
+                    </a:srgbClr>
+                  </a:outerShdw>
+                </a:effectLst>
+              </a:rPr>
               <a:t> </a:t>
             </a:r>
             <a:r>
-              <a:rPr lang="el-GR" dirty="0"/>
-              <a:t>είναι το παρακάτω και μπορεί να χρησιμοποιηθεί και έτσι κατευθείαν.</a:t>
+              <a:rPr lang="en-US" dirty="0">
+                <a:sym typeface="Wingdings" panose="05000000000000000000" pitchFamily="2" charset="2"/>
+              </a:rPr>
+              <a:t> </a:t>
+            </a:r>
+            <a:r>
+              <a:rPr lang="el-GR" dirty="0">
+                <a:sym typeface="Wingdings" panose="05000000000000000000" pitchFamily="2" charset="2"/>
+              </a:rPr>
+              <a:t>Για την εκτέλεση του </a:t>
+            </a:r>
+            <a:r>
+              <a:rPr lang="en-US" dirty="0">
+                <a:sym typeface="Wingdings" panose="05000000000000000000" pitchFamily="2" charset="2"/>
+              </a:rPr>
+              <a:t>parser</a:t>
             </a:r>
           </a:p>
           <a:p>
             <a:pPr marL="0" indent="0">
               <a:buNone/>
             </a:pPr>
-            <a:r>
-              <a:rPr lang="en-US" sz="2000" dirty="0">
-                <a:hlinkClick r:id="rId2"/>
+            <a:endParaRPr lang="en-US" sz="2800" dirty="0">
+              <a:sym typeface="Wingdings" panose="05000000000000000000" pitchFamily="2" charset="2"/>
+            </a:endParaRPr>
+          </a:p>
+          <a:p>
+            <a:pPr marL="0" indent="0">
+              <a:buNone/>
+            </a:pPr>
+            <a:r>
+              <a:rPr lang="el-GR" dirty="0">
+                <a:sym typeface="Wingdings" panose="05000000000000000000" pitchFamily="2" charset="2"/>
               </a:rPr>
-              <a:t>http://localhost:8080/</a:t>
-            </a:r>
-            <a:r>
-              <a:rPr lang="en-US" sz="2000" dirty="0" err="1">
-                <a:hlinkClick r:id="rId2"/>
+              <a:t>Σημείωση : Το </a:t>
+            </a:r>
+            <a:r>
+              <a:rPr lang="en-US" dirty="0">
+                <a:sym typeface="Wingdings" panose="05000000000000000000" pitchFamily="2" charset="2"/>
               </a:rPr>
-              <a:t>appathon_project</a:t>
-            </a:r>
-            <a:r>
-              <a:rPr lang="en-US" sz="2000" dirty="0">
-                <a:hlinkClick r:id="rId2"/>
+              <a:t>project </a:t>
+            </a:r>
+            <a:r>
+              <a:rPr lang="el-GR" dirty="0">
+                <a:sym typeface="Wingdings" panose="05000000000000000000" pitchFamily="2" charset="2"/>
               </a:rPr>
-              <a:t>/</a:t>
-            </a:r>
-            <a:r>
-              <a:rPr lang="en-US" sz="2000">
-                <a:hlinkClick r:id="rId2"/>
+              <a:t>δημιουργήθηκε σε</a:t>
+            </a:r>
+            <a:r>
+              <a:rPr lang="en-US" dirty="0">
+                <a:sym typeface="Wingdings" panose="05000000000000000000" pitchFamily="2" charset="2"/>
               </a:rPr>
-              <a:t>index.</a:t>
-            </a:r>
-            <a:r>
-              <a:rPr lang="en-US" sz="2000" dirty="0" err="1">
-                <a:hlinkClick r:id="rId2"/>
+              <a:t> </a:t>
+            </a:r>
+            <a:r>
+              <a:rPr lang="el-GR" dirty="0">
+                <a:sym typeface="Wingdings" panose="05000000000000000000" pitchFamily="2" charset="2"/>
               </a:rPr>
-              <a:t>html?search</a:t>
-            </a:r>
-            <a:r>
-              <a:rPr lang="en-US" sz="2000" dirty="0">
-                <a:hlinkClick r:id="rId2"/>
+              <a:t>περιβάλλον </a:t>
+            </a:r>
+            <a:r>
+              <a:rPr lang="en-US" dirty="0">
+                <a:sym typeface="Wingdings" panose="05000000000000000000" pitchFamily="2" charset="2"/>
               </a:rPr>
-              <a:t>=“</a:t>
-            </a:r>
-            <a:r>
-              <a:rPr lang="en-US" sz="2000" dirty="0" err="1">
-                <a:hlinkClick r:id="rId2"/>
+              <a:t>eclipse </a:t>
+            </a:r>
+            <a:r>
+              <a:rPr lang="el-GR" dirty="0">
+                <a:sym typeface="Wingdings" panose="05000000000000000000" pitchFamily="2" charset="2"/>
               </a:rPr>
-              <a:t>disease”&amp;format</a:t>
-            </a:r>
-            <a:r>
-              <a:rPr lang="en-US" sz="2000" dirty="0">
-                <a:hlinkClick r:id="rId2"/>
+              <a:t>και με </a:t>
+            </a:r>
+            <a:r>
+              <a:rPr lang="en-US" dirty="0">
+                <a:sym typeface="Wingdings" panose="05000000000000000000" pitchFamily="2" charset="2"/>
               </a:rPr>
-              <a:t>={</a:t>
-            </a:r>
-            <a:r>
-              <a:rPr lang="en-US" sz="2000" dirty="0" err="1">
-                <a:hlinkClick r:id="rId2"/>
+              <a:t>Tomcat v9.0 </a:t>
+            </a:r>
+            <a:r>
+              <a:rPr lang="el-GR" dirty="0">
+                <a:sym typeface="Wingdings" panose="05000000000000000000" pitchFamily="2" charset="2"/>
               </a:rPr>
-              <a:t>json,map</a:t>
-            </a:r>
-            <a:r>
-              <a:rPr lang="en-US" sz="2000" dirty="0">
-                <a:hlinkClick r:id="rId2"/>
+              <a:t>ως </a:t>
+            </a:r>
+            <a:r>
+              <a:rPr lang="en-US" dirty="0">
+                <a:sym typeface="Wingdings" panose="05000000000000000000" pitchFamily="2" charset="2"/>
               </a:rPr>
-              <a:t>}</a:t>
-            </a:r>
-            <a:endParaRPr lang="en-US" sz="2000" dirty="0"/>
-          </a:p>
-          <a:p>
-            <a:pPr marL="0" indent="0">
-              <a:buNone/>
-            </a:pPr>
-            <a:endParaRPr lang="en-US" sz="2000" dirty="0"/>
-          </a:p>
-          <a:p>
-            <a:pPr marL="0" indent="0">
-              <a:buNone/>
-            </a:pPr>
-            <a:r>
-              <a:rPr lang="el-GR" dirty="0"/>
-              <a:t>Τέλος προσπαθήσαμε να προσθέσουμε και ένα </a:t>
-            </a:r>
-            <a:r>
-              <a:rPr lang="en-US" dirty="0"/>
-              <a:t>loader </a:t>
-            </a:r>
-            <a:r>
-              <a:rPr lang="el-GR" dirty="0"/>
-              <a:t>,δλδ ένα </a:t>
-            </a:r>
-            <a:r>
-              <a:rPr lang="en-US" dirty="0"/>
-              <a:t>gif </a:t>
-            </a:r>
-            <a:r>
-              <a:rPr lang="el-GR" dirty="0"/>
-              <a:t>που θα εμφανίζεται όσο φορτώνει η σελίδα, ωστόσο δεν τα καταφέραμε λόγω του </a:t>
-            </a:r>
-            <a:r>
-              <a:rPr lang="en-US" dirty="0"/>
-              <a:t>synchronous </a:t>
-            </a:r>
-            <a:r>
-              <a:rPr lang="en-US" dirty="0" err="1"/>
-              <a:t>xmlhttp</a:t>
-            </a:r>
-            <a:r>
-              <a:rPr lang="en-US" dirty="0"/>
-              <a:t> request </a:t>
-            </a:r>
-            <a:r>
-              <a:rPr lang="el-GR" dirty="0"/>
-              <a:t>που χρησιμοποιήσαμε.</a:t>
-            </a:r>
-            <a:endParaRPr lang="en-US" dirty="0"/>
+              <a:t>server</a:t>
+            </a:r>
+            <a:endParaRPr lang="el-GR" sz="2800" dirty="0"/>
           </a:p>
         </p:txBody>
       </p:sp>
     </p:spTree>
     <p:extLst>
       <p:ext uri="{BB962C8B-B14F-4D97-AF65-F5344CB8AC3E}">
-        <p14:creationId xmlns:p14="http://schemas.microsoft.com/office/powerpoint/2010/main" val="2465962750"/>
+        <p14:creationId xmlns:p14="http://schemas.microsoft.com/office/powerpoint/2010/main" val="1993335336"/>
       </p:ext>
     </p:extLst>
   </p:cSld>
@@ -5436,7 +5219,7 @@
           <p:cNvPr id="2" name="Title 1">
             <a:extLst>
               <a:ext uri="{FF2B5EF4-FFF2-40B4-BE49-F238E27FC236}">
-                <a16:creationId xmlns:a16="http://schemas.microsoft.com/office/drawing/2014/main" id="{46B2786A-7BD1-47ED-8298-E415C5ACDFA1}"/>
+                <a16:creationId xmlns:a16="http://schemas.microsoft.com/office/drawing/2014/main" id="{92C1792D-3109-4682-B073-92141074C292}"/>
               </a:ext>
             </a:extLst>
           </p:cNvPr>
@@ -5454,17 +5237,17 @@
           <a:p>
             <a:r>
               <a:rPr lang="el-GR" dirty="0"/>
-              <a:t>Συνολικά προαπαιτούμενα</a:t>
-            </a:r>
-          </a:p>
-        </p:txBody>
-      </p:sp>
-      <p:sp>
-        <p:nvSpPr>
-          <p:cNvPr id="3" name="Content Placeholder 2">
-            <a:extLst>
-              <a:ext uri="{FF2B5EF4-FFF2-40B4-BE49-F238E27FC236}">
-                <a16:creationId xmlns:a16="http://schemas.microsoft.com/office/drawing/2014/main" id="{5590F1AB-3D4E-4D9B-9232-0BF563478356}"/>
+              <a:t>Παραδείγματα</a:t>
+            </a:r>
+          </a:p>
+        </p:txBody>
+      </p:sp>
+      <p:sp>
+        <p:nvSpPr>
+          <p:cNvPr id="7" name="Content Placeholder 6">
+            <a:extLst>
+              <a:ext uri="{FF2B5EF4-FFF2-40B4-BE49-F238E27FC236}">
+                <a16:creationId xmlns:a16="http://schemas.microsoft.com/office/drawing/2014/main" id="{57833AC9-E6DD-4B7B-AFA0-94159E7823A3}"/>
               </a:ext>
             </a:extLst>
           </p:cNvPr>
@@ -5484,187 +5267,53 @@
               <a:buNone/>
             </a:pPr>
             <a:r>
-              <a:rPr lang="en-US" dirty="0">
-                <a:effectLst>
-                  <a:outerShdw blurRad="38100" dist="38100" dir="2700000" algn="tl">
-                    <a:srgbClr val="000000">
-                      <a:alpha val="43137"/>
-                    </a:srgbClr>
-                  </a:outerShdw>
-                </a:effectLst>
-              </a:rPr>
-              <a:t>pip3 install </a:t>
-            </a:r>
-            <a:r>
-              <a:rPr lang="en-US" dirty="0" err="1">
-                <a:effectLst>
-                  <a:outerShdw blurRad="38100" dist="38100" dir="2700000" algn="tl">
-                    <a:srgbClr val="000000">
-                      <a:alpha val="43137"/>
-                    </a:srgbClr>
-                  </a:outerShdw>
-                </a:effectLst>
-              </a:rPr>
-              <a:t>mysql.connector</a:t>
-            </a:r>
-            <a:r>
-              <a:rPr lang="en-US" dirty="0">
-                <a:effectLst>
-                  <a:outerShdw blurRad="38100" dist="38100" dir="2700000" algn="tl">
-                    <a:srgbClr val="000000">
-                      <a:alpha val="43137"/>
-                    </a:srgbClr>
-                  </a:outerShdw>
-                </a:effectLst>
-              </a:rPr>
-              <a:t> </a:t>
-            </a:r>
-            <a:r>
-              <a:rPr lang="en-US" dirty="0">
-                <a:sym typeface="Wingdings" panose="05000000000000000000" pitchFamily="2" charset="2"/>
-              </a:rPr>
-              <a:t> </a:t>
-            </a:r>
-            <a:r>
-              <a:rPr lang="el-GR" dirty="0">
-                <a:sym typeface="Wingdings" panose="05000000000000000000" pitchFamily="2" charset="2"/>
-              </a:rPr>
-              <a:t>Για την εκτέλεση του </a:t>
-            </a:r>
-            <a:r>
-              <a:rPr lang="en-US" dirty="0">
-                <a:sym typeface="Wingdings" panose="05000000000000000000" pitchFamily="2" charset="2"/>
-              </a:rPr>
-              <a:t>parser</a:t>
-            </a:r>
-          </a:p>
-          <a:p>
-            <a:pPr marL="0" indent="0">
-              <a:buNone/>
-            </a:pPr>
-            <a:r>
-              <a:rPr lang="en-US" sz="2800" dirty="0">
-                <a:effectLst>
-                  <a:outerShdw blurRad="38100" dist="38100" dir="2700000" algn="tl">
-                    <a:srgbClr val="000000">
-                      <a:alpha val="43137"/>
-                    </a:srgbClr>
-                  </a:outerShdw>
-                </a:effectLst>
-              </a:rPr>
-              <a:t>set path=%path%; "C:\Programming\xampp\php"  </a:t>
-            </a:r>
-            <a:r>
-              <a:rPr lang="en-US" sz="2800" dirty="0">
-                <a:sym typeface="Wingdings" panose="05000000000000000000" pitchFamily="2" charset="2"/>
-              </a:rPr>
-              <a:t> </a:t>
-            </a:r>
-            <a:r>
-              <a:rPr lang="el-GR" sz="2800" dirty="0">
-                <a:sym typeface="Wingdings" panose="05000000000000000000" pitchFamily="2" charset="2"/>
-              </a:rPr>
-              <a:t>Προσθήκη </a:t>
-            </a:r>
-            <a:r>
-              <a:rPr lang="en-US" sz="2800" dirty="0">
-                <a:sym typeface="Wingdings" panose="05000000000000000000" pitchFamily="2" charset="2"/>
-              </a:rPr>
-              <a:t>php </a:t>
-            </a:r>
-            <a:r>
-              <a:rPr lang="el-GR" sz="2800" dirty="0">
-                <a:sym typeface="Wingdings" panose="05000000000000000000" pitchFamily="2" charset="2"/>
-              </a:rPr>
-              <a:t>στο </a:t>
-            </a:r>
-            <a:r>
-              <a:rPr lang="en-US" sz="2800" dirty="0">
-                <a:sym typeface="Wingdings" panose="05000000000000000000" pitchFamily="2" charset="2"/>
-              </a:rPr>
-              <a:t>path </a:t>
-            </a:r>
-            <a:r>
-              <a:rPr lang="el-GR" sz="2800" dirty="0">
-                <a:sym typeface="Wingdings" panose="05000000000000000000" pitchFamily="2" charset="2"/>
-              </a:rPr>
-              <a:t>ώστε να μπορεί να εκτελεστεί το </a:t>
-            </a:r>
-            <a:r>
-              <a:rPr lang="en-US" dirty="0">
-                <a:sym typeface="Wingdings" panose="05000000000000000000" pitchFamily="2" charset="2"/>
-              </a:rPr>
-              <a:t>MySQL query.</a:t>
-            </a:r>
-          </a:p>
-          <a:p>
-            <a:pPr marL="0" indent="0">
-              <a:buNone/>
-            </a:pPr>
-            <a:endParaRPr lang="en-US" sz="2800" dirty="0">
-              <a:sym typeface="Wingdings" panose="05000000000000000000" pitchFamily="2" charset="2"/>
-            </a:endParaRPr>
-          </a:p>
-          <a:p>
-            <a:pPr marL="0" indent="0">
-              <a:buNone/>
-            </a:pPr>
-            <a:r>
-              <a:rPr lang="el-GR" dirty="0">
-                <a:sym typeface="Wingdings" panose="05000000000000000000" pitchFamily="2" charset="2"/>
-              </a:rPr>
-              <a:t>Σημείωση : Το </a:t>
-            </a:r>
-            <a:r>
-              <a:rPr lang="en-US" dirty="0">
-                <a:sym typeface="Wingdings" panose="05000000000000000000" pitchFamily="2" charset="2"/>
-              </a:rPr>
-              <a:t>project </a:t>
-            </a:r>
-            <a:r>
-              <a:rPr lang="el-GR" dirty="0">
-                <a:sym typeface="Wingdings" panose="05000000000000000000" pitchFamily="2" charset="2"/>
-              </a:rPr>
-              <a:t>δημιουργήθηκε σε </a:t>
-            </a:r>
-            <a:r>
-              <a:rPr lang="en-US" dirty="0">
-                <a:sym typeface="Wingdings" panose="05000000000000000000" pitchFamily="2" charset="2"/>
-              </a:rPr>
-              <a:t>eclipse </a:t>
-            </a:r>
-            <a:r>
-              <a:rPr lang="el-GR" dirty="0">
-                <a:sym typeface="Wingdings" panose="05000000000000000000" pitchFamily="2" charset="2"/>
-              </a:rPr>
-              <a:t>και με </a:t>
-            </a:r>
-            <a:r>
-              <a:rPr lang="en-US" dirty="0">
-                <a:sym typeface="Wingdings" panose="05000000000000000000" pitchFamily="2" charset="2"/>
-              </a:rPr>
-              <a:t>Tomcat v9.0 </a:t>
-            </a:r>
-            <a:r>
-              <a:rPr lang="el-GR" dirty="0">
-                <a:sym typeface="Wingdings" panose="05000000000000000000" pitchFamily="2" charset="2"/>
-              </a:rPr>
-              <a:t>ως </a:t>
-            </a:r>
-            <a:r>
-              <a:rPr lang="en-US" dirty="0">
-                <a:sym typeface="Wingdings" panose="05000000000000000000" pitchFamily="2" charset="2"/>
-              </a:rPr>
-              <a:t>server</a:t>
-            </a:r>
-            <a:endParaRPr lang="el-GR" sz="2800" dirty="0"/>
-          </a:p>
-        </p:txBody>
-      </p:sp>
+              <a:rPr lang="en-US" dirty="0" err="1"/>
+              <a:t>index.jsp</a:t>
+            </a:r>
+            <a:endParaRPr lang="el-GR" dirty="0"/>
+          </a:p>
+        </p:txBody>
+      </p:sp>
+      <p:pic>
+        <p:nvPicPr>
+          <p:cNvPr id="4" name="Picture 3">
+            <a:extLst>
+              <a:ext uri="{FF2B5EF4-FFF2-40B4-BE49-F238E27FC236}">
+                <a16:creationId xmlns:a16="http://schemas.microsoft.com/office/drawing/2014/main" id="{5DFCBBC2-390F-4EEB-893A-1935E9BAFFB4}"/>
+              </a:ext>
+            </a:extLst>
+          </p:cNvPr>
+          <p:cNvPicPr>
+            <a:picLocks noChangeAspect="1"/>
+          </p:cNvPicPr>
+          <p:nvPr/>
+        </p:nvPicPr>
+        <p:blipFill>
+          <a:blip r:embed="rId2">
+            <a:extLst>
+              <a:ext uri="{28A0092B-C50C-407E-A947-70E740481C1C}">
+                <a14:useLocalDpi xmlns:a14="http://schemas.microsoft.com/office/drawing/2010/main" val="0"/>
+              </a:ext>
+            </a:extLst>
+          </a:blip>
+          <a:stretch>
+            <a:fillRect/>
+          </a:stretch>
+        </p:blipFill>
+        <p:spPr>
+          <a:xfrm>
+            <a:off x="3062796" y="1392536"/>
+            <a:ext cx="8140518" cy="5465463"/>
+          </a:xfrm>
+          <a:prstGeom prst="rect">
+            <a:avLst/>
+          </a:prstGeom>
+        </p:spPr>
+      </p:pic>
     </p:spTree>
     <p:extLst>
       <p:ext uri="{BB962C8B-B14F-4D97-AF65-F5344CB8AC3E}">
-        <p14:creationId xmlns:p14="http://schemas.microsoft.com/office/powerpoint/2010/main" val="1993335336"/>
+        <p14:creationId xmlns:p14="http://schemas.microsoft.com/office/powerpoint/2010/main" val="2986721892"/>
       </p:ext>
     </p:extLst>
   </p:cSld>
@@ -5696,7 +5345,7 @@
           <p:cNvPr id="2" name="Title 1">
             <a:extLst>
               <a:ext uri="{FF2B5EF4-FFF2-40B4-BE49-F238E27FC236}">
-                <a16:creationId xmlns:a16="http://schemas.microsoft.com/office/drawing/2014/main" id="{92C1792D-3109-4682-B073-92141074C292}"/>
+                <a16:creationId xmlns:a16="http://schemas.microsoft.com/office/drawing/2014/main" id="{0FF57752-D139-41A6-B9FC-4A9090D18043}"/>
               </a:ext>
             </a:extLst>
           </p:cNvPr>
@@ -5714,17 +5363,17 @@
           <a:p>
             <a:r>
               <a:rPr lang="el-GR" dirty="0"/>
-              <a:t>Παραδείγματα</a:t>
-            </a:r>
-          </a:p>
-        </p:txBody>
-      </p:sp>
-      <p:sp>
-        <p:nvSpPr>
-          <p:cNvPr id="7" name="Content Placeholder 6">
-            <a:extLst>
-              <a:ext uri="{FF2B5EF4-FFF2-40B4-BE49-F238E27FC236}">
-                <a16:creationId xmlns:a16="http://schemas.microsoft.com/office/drawing/2014/main" id="{57833AC9-E6DD-4B7B-AFA0-94159E7823A3}"/>
+              <a:t>Παραδείγματα(2)</a:t>
+            </a:r>
+          </a:p>
+        </p:txBody>
+      </p:sp>
+      <p:sp>
+        <p:nvSpPr>
+          <p:cNvPr id="3" name="Content Placeholder 2">
+            <a:extLst>
+              <a:ext uri="{FF2B5EF4-FFF2-40B4-BE49-F238E27FC236}">
+                <a16:creationId xmlns:a16="http://schemas.microsoft.com/office/drawing/2014/main" id="{567AE718-4E57-4C5C-9919-B1C2632C57B5}"/>
               </a:ext>
             </a:extLst>
           </p:cNvPr>
@@ -5744,19 +5393,69 @@
               <a:buNone/>
             </a:pPr>
             <a:r>
+              <a:rPr lang="el-GR" dirty="0"/>
+              <a:t>Αναζήτηση για</a:t>
+            </a:r>
+          </a:p>
+          <a:p>
+            <a:pPr marL="0" indent="0">
+              <a:buNone/>
+            </a:pPr>
+            <a:r>
+              <a:rPr lang="el-GR" dirty="0"/>
+              <a:t>την ασθένεια</a:t>
+            </a:r>
+          </a:p>
+          <a:p>
+            <a:pPr marL="0" indent="0">
+              <a:buNone/>
+            </a:pPr>
+            <a:r>
               <a:rPr lang="en-US" dirty="0"/>
-              <a:t>index.html</a:t>
-            </a:r>
+              <a:t>Brain Tumor</a:t>
+            </a:r>
+            <a:r>
+              <a:rPr lang="el-GR" dirty="0"/>
+              <a:t> , </a:t>
+            </a:r>
+            <a:endParaRPr lang="en-US"/>
+          </a:p>
+          <a:p>
+            <a:pPr marL="0" indent="0">
+              <a:buNone/>
+            </a:pPr>
+            <a:r>
+              <a:rPr lang="el-GR"/>
+              <a:t>σε </a:t>
+            </a:r>
+            <a:r>
+              <a:rPr lang="en-US" dirty="0"/>
+              <a:t>map</a:t>
+            </a:r>
+          </a:p>
+          <a:p>
+            <a:pPr marL="0" indent="0">
+              <a:buNone/>
+            </a:pPr>
+            <a:r>
+              <a:rPr lang="el-GR" dirty="0"/>
+              <a:t>παρουσίαση.</a:t>
+            </a:r>
+          </a:p>
+          <a:p>
+            <a:pPr marL="0" indent="0">
+              <a:buNone/>
+            </a:pPr>
             <a:endParaRPr lang="el-GR" dirty="0"/>
           </a:p>
         </p:txBody>
       </p:sp>
       <p:pic>
         <p:nvPicPr>
-          <p:cNvPr id="9" name="Picture 8">
-            <a:extLst>
-              <a:ext uri="{FF2B5EF4-FFF2-40B4-BE49-F238E27FC236}">
-                <a16:creationId xmlns:a16="http://schemas.microsoft.com/office/drawing/2014/main" id="{B87AB9CD-EEE9-47A0-B373-3D5A2EB40A1A}"/>
+          <p:cNvPr id="5" name="Picture 4">
+            <a:extLst>
+              <a:ext uri="{FF2B5EF4-FFF2-40B4-BE49-F238E27FC236}">
+                <a16:creationId xmlns:a16="http://schemas.microsoft.com/office/drawing/2014/main" id="{13E72CE0-A2AE-4438-8CE9-DCCC82A3754A}"/>
               </a:ext>
             </a:extLst>
           </p:cNvPr>
@@ -5779,8 +5478,8 @@
         </p:blipFill>
         <p:spPr>
           <a:xfrm>
-            <a:off x="2757268" y="1289248"/>
-            <a:ext cx="8689123" cy="5568752"/>
+            <a:off x="3349472" y="1597981"/>
+            <a:ext cx="7890027" cy="5260018"/>
           </a:xfrm>
           <a:prstGeom prst="rect">
             <a:avLst/>
@@ -5790,7 +5489,7 @@
     </p:spTree>
     <p:extLst>
       <p:ext uri="{BB962C8B-B14F-4D97-AF65-F5344CB8AC3E}">
-        <p14:creationId xmlns:p14="http://schemas.microsoft.com/office/powerpoint/2010/main" val="2986721892"/>
+        <p14:creationId xmlns:p14="http://schemas.microsoft.com/office/powerpoint/2010/main" val="3825237053"/>
       </p:ext>
     </p:extLst>
   </p:cSld>
@@ -5822,7 +5521,7 @@
           <p:cNvPr id="2" name="Title 1">
             <a:extLst>
               <a:ext uri="{FF2B5EF4-FFF2-40B4-BE49-F238E27FC236}">
-                <a16:creationId xmlns:a16="http://schemas.microsoft.com/office/drawing/2014/main" id="{0FF57752-D139-41A6-B9FC-4A9090D18043}"/>
+                <a16:creationId xmlns:a16="http://schemas.microsoft.com/office/drawing/2014/main" id="{0B7E96FC-C6AC-4E56-9661-EE99DA898731}"/>
               </a:ext>
             </a:extLst>
           </p:cNvPr>
@@ -5840,7 +5539,7 @@
           <a:p>
             <a:r>
               <a:rPr lang="el-GR" dirty="0"/>
-              <a:t>Παραδείγματα(2)</a:t>
+              <a:t>Παραδείγματα(3)</a:t>
             </a:r>
           </a:p>
         </p:txBody>
@@ -5850,7 +5549,7 @@
           <p:cNvPr id="3" name="Content Placeholder 2">
             <a:extLst>
               <a:ext uri="{FF2B5EF4-FFF2-40B4-BE49-F238E27FC236}">
-                <a16:creationId xmlns:a16="http://schemas.microsoft.com/office/drawing/2014/main" id="{567AE718-4E57-4C5C-9919-B1C2632C57B5}"/>
+                <a16:creationId xmlns:a16="http://schemas.microsoft.com/office/drawing/2014/main" id="{40107A26-F93A-4591-8343-3D26146D46D8}"/>
               </a:ext>
             </a:extLst>
           </p:cNvPr>
@@ -5889,15 +5588,25 @@
             </a:pPr>
             <a:r>
               <a:rPr lang="en-US" dirty="0"/>
-              <a:t>AIDS</a:t>
-            </a:r>
-            <a:r>
-              <a:rPr lang="el-GR" dirty="0"/>
-              <a:t> , σε </a:t>
+              <a:t>Brain Tumor</a:t>
+            </a:r>
+            <a:r>
+              <a:rPr lang="el-GR" dirty="0"/>
+              <a:t>,</a:t>
+            </a:r>
+            <a:endParaRPr lang="en-US" dirty="0"/>
+          </a:p>
+          <a:p>
+            <a:pPr marL="0" indent="0">
+              <a:buNone/>
+            </a:pPr>
+            <a:r>
+              <a:rPr lang="el-GR" dirty="0"/>
+              <a:t>σε </a:t>
             </a:r>
             <a:r>
               <a:rPr lang="en-US" dirty="0"/>
-              <a:t>map</a:t>
+              <a:t>json</a:t>
             </a:r>
           </a:p>
           <a:p>
@@ -5910,19 +5619,16 @@
             </a:r>
           </a:p>
           <a:p>
-            <a:pPr marL="0" indent="0">
-              <a:buNone/>
-            </a:pPr>
             <a:endParaRPr lang="el-GR" dirty="0"/>
           </a:p>
         </p:txBody>
       </p:sp>
       <p:pic>
         <p:nvPicPr>
-          <p:cNvPr id="7" name="Picture 6">
-            <a:extLst>
-              <a:ext uri="{FF2B5EF4-FFF2-40B4-BE49-F238E27FC236}">
-                <a16:creationId xmlns:a16="http://schemas.microsoft.com/office/drawing/2014/main" id="{ACAFA92D-A204-4CD0-BEE5-5BB6E68D3EF4}"/>
+          <p:cNvPr id="6" name="Picture 5">
+            <a:extLst>
+              <a:ext uri="{FF2B5EF4-FFF2-40B4-BE49-F238E27FC236}">
+                <a16:creationId xmlns:a16="http://schemas.microsoft.com/office/drawing/2014/main" id="{7CE7ADAF-8DDF-4EA4-A849-0EC5AAA7A6F0}"/>
               </a:ext>
             </a:extLst>
           </p:cNvPr>
@@ -5945,8 +5651,8 @@
         </p:blipFill>
         <p:spPr>
           <a:xfrm>
-            <a:off x="3601328" y="1448972"/>
-            <a:ext cx="7496977" cy="5409027"/>
+            <a:off x="3087434" y="1690688"/>
+            <a:ext cx="9104566" cy="3644792"/>
           </a:xfrm>
           <a:prstGeom prst="rect">
             <a:avLst/>
@@ -5956,7 +5662,7 @@
     </p:spTree>
     <p:extLst>
       <p:ext uri="{BB962C8B-B14F-4D97-AF65-F5344CB8AC3E}">
-        <p14:creationId xmlns:p14="http://schemas.microsoft.com/office/powerpoint/2010/main" val="3825237053"/>
+        <p14:creationId xmlns:p14="http://schemas.microsoft.com/office/powerpoint/2010/main" val="3916805204"/>
       </p:ext>
     </p:extLst>
   </p:cSld>

</xml_diff>